<commit_message>
Slides for 2 agenda points added: "Integration of WoT Thing Directory discovery in the iotschema-node-red project", and "Roadmap for 2019".
</commit_message>
<xml_diff>
--- a/iotschema-20190117.pptx
+++ b/iotschema-20190117.pptx
@@ -2,19 +2,37 @@
 <file path=ppt/presentation.xml><?xml version="1.0" encoding="utf-8"?>
 <p:presentation xmlns:a="http://schemas.openxmlformats.org/drawingml/2006/main" xmlns:r="http://schemas.openxmlformats.org/officeDocument/2006/relationships" xmlns:p="http://schemas.openxmlformats.org/presentationml/2006/main" saveSubsetFonts="1" autoCompressPictures="0">
   <p:sldMasterIdLst>
-    <p:sldMasterId id="2147483660" r:id="rId1"/>
+    <p:sldMasterId id="2147483660" r:id="rId8"/>
   </p:sldMasterIdLst>
+  <p:notesMasterIdLst>
+    <p:notesMasterId r:id="rId22"/>
+  </p:notesMasterIdLst>
   <p:sldIdLst>
-    <p:sldId id="256" r:id="rId2"/>
-    <p:sldId id="257" r:id="rId3"/>
-    <p:sldId id="258" r:id="rId4"/>
-    <p:sldId id="259" r:id="rId5"/>
-    <p:sldId id="260" r:id="rId6"/>
-    <p:sldId id="261" r:id="rId7"/>
-    <p:sldId id="262" r:id="rId8"/>
+    <p:sldId id="256" r:id="rId9"/>
+    <p:sldId id="257" r:id="rId10"/>
+    <p:sldId id="263" r:id="rId11"/>
+    <p:sldId id="264" r:id="rId12"/>
+    <p:sldId id="265" r:id="rId13"/>
+    <p:sldId id="266" r:id="rId14"/>
+    <p:sldId id="258" r:id="rId15"/>
+    <p:sldId id="259" r:id="rId16"/>
+    <p:sldId id="260" r:id="rId17"/>
+    <p:sldId id="261" r:id="rId18"/>
+    <p:sldId id="262" r:id="rId19"/>
+    <p:sldId id="267" r:id="rId20"/>
+    <p:sldId id="268" r:id="rId21"/>
   </p:sldIdLst>
   <p:sldSz cx="9144000" cy="6858000" type="letter"/>
   <p:notesSz cx="6858000" cy="9144000"/>
+  <p:custDataLst>
+    <p:custData r:id="rId7"/>
+    <p:custData r:id="rId1"/>
+    <p:custData r:id="rId6"/>
+    <p:custData r:id="rId3"/>
+    <p:custData r:id="rId5"/>
+    <p:custData r:id="rId2"/>
+    <p:custData r:id="rId4"/>
+  </p:custDataLst>
   <p:defaultTextStyle>
     <a:defPPr>
       <a:defRPr lang="en-US"/>
@@ -112,10 +130,1452 @@
   </p:defaultTextStyle>
   <p:extLst>
     <p:ext uri="{EFAFB233-063F-42B5-8137-9DF3F51BA10A}">
-      <p15:sldGuideLst xmlns:p15="http://schemas.microsoft.com/office/powerpoint/2012/main"/>
+      <p15:sldGuideLst xmlns:p15="http://schemas.microsoft.com/office/powerpoint/2012/main" xmlns=""/>
     </p:ext>
   </p:extLst>
 </p:presentation>
+</file>
+
+<file path=ppt/notesMasters/notesMaster1.xml><?xml version="1.0" encoding="utf-8"?>
+<p:notesMaster xmlns:a="http://schemas.openxmlformats.org/drawingml/2006/main" xmlns:r="http://schemas.openxmlformats.org/officeDocument/2006/relationships" xmlns:p="http://schemas.openxmlformats.org/presentationml/2006/main">
+  <p:cSld>
+    <p:bg>
+      <p:bgRef idx="1001">
+        <a:schemeClr val="bg1"/>
+      </p:bgRef>
+    </p:bg>
+    <p:spTree>
+      <p:nvGrpSpPr>
+        <p:cNvPr id="1" name=""/>
+        <p:cNvGrpSpPr/>
+        <p:nvPr/>
+      </p:nvGrpSpPr>
+      <p:grpSpPr>
+        <a:xfrm>
+          <a:off x="0" y="0"/>
+          <a:ext cx="0" cy="0"/>
+          <a:chOff x="0" y="0"/>
+          <a:chExt cx="0" cy="0"/>
+        </a:xfrm>
+      </p:grpSpPr>
+      <p:sp>
+        <p:nvSpPr>
+          <p:cNvPr id="2" name="Header Placeholder 1"/>
+          <p:cNvSpPr>
+            <a:spLocks noGrp="1"/>
+          </p:cNvSpPr>
+          <p:nvPr>
+            <p:ph type="hdr" sz="quarter"/>
+          </p:nvPr>
+        </p:nvSpPr>
+        <p:spPr>
+          <a:xfrm>
+            <a:off x="0" y="0"/>
+            <a:ext cx="2971800" cy="457200"/>
+          </a:xfrm>
+          <a:prstGeom prst="rect">
+            <a:avLst/>
+          </a:prstGeom>
+        </p:spPr>
+        <p:txBody>
+          <a:bodyPr vert="horz" lIns="91440" tIns="45720" rIns="91440" bIns="45720" rtlCol="0"/>
+          <a:lstStyle>
+            <a:lvl1pPr algn="l">
+              <a:defRPr sz="1200"/>
+            </a:lvl1pPr>
+          </a:lstStyle>
+          <a:p>
+            <a:endParaRPr lang="en-US"/>
+          </a:p>
+        </p:txBody>
+      </p:sp>
+      <p:sp>
+        <p:nvSpPr>
+          <p:cNvPr id="3" name="Date Placeholder 2"/>
+          <p:cNvSpPr>
+            <a:spLocks noGrp="1"/>
+          </p:cNvSpPr>
+          <p:nvPr>
+            <p:ph type="dt" idx="1"/>
+          </p:nvPr>
+        </p:nvSpPr>
+        <p:spPr>
+          <a:xfrm>
+            <a:off x="3884613" y="0"/>
+            <a:ext cx="2971800" cy="457200"/>
+          </a:xfrm>
+          <a:prstGeom prst="rect">
+            <a:avLst/>
+          </a:prstGeom>
+        </p:spPr>
+        <p:txBody>
+          <a:bodyPr vert="horz" lIns="91440" tIns="45720" rIns="91440" bIns="45720" rtlCol="0"/>
+          <a:lstStyle>
+            <a:lvl1pPr algn="r">
+              <a:defRPr sz="1200"/>
+            </a:lvl1pPr>
+          </a:lstStyle>
+          <a:p>
+            <a:fld id="{D4DBAFEA-10B2-4AD7-A888-C9C854D09936}" type="datetimeFigureOut">
+              <a:rPr lang="en-US" smtClean="0"/>
+              <a:t>1/17/2019</a:t>
+            </a:fld>
+            <a:endParaRPr lang="en-US"/>
+          </a:p>
+        </p:txBody>
+      </p:sp>
+      <p:sp>
+        <p:nvSpPr>
+          <p:cNvPr id="4" name="Slide Image Placeholder 3"/>
+          <p:cNvSpPr>
+            <a:spLocks noGrp="1" noRot="1" noChangeAspect="1"/>
+          </p:cNvSpPr>
+          <p:nvPr>
+            <p:ph type="sldImg" idx="2"/>
+          </p:nvPr>
+        </p:nvSpPr>
+        <p:spPr>
+          <a:xfrm>
+            <a:off x="1143000" y="685800"/>
+            <a:ext cx="4572000" cy="3429000"/>
+          </a:xfrm>
+          <a:prstGeom prst="rect">
+            <a:avLst/>
+          </a:prstGeom>
+          <a:noFill/>
+          <a:ln w="12700">
+            <a:solidFill>
+              <a:prstClr val="black"/>
+            </a:solidFill>
+          </a:ln>
+        </p:spPr>
+        <p:txBody>
+          <a:bodyPr vert="horz" lIns="91440" tIns="45720" rIns="91440" bIns="45720" rtlCol="0" anchor="ctr"/>
+          <a:lstStyle/>
+          <a:p>
+            <a:endParaRPr lang="en-US"/>
+          </a:p>
+        </p:txBody>
+      </p:sp>
+      <p:sp>
+        <p:nvSpPr>
+          <p:cNvPr id="5" name="Notes Placeholder 4"/>
+          <p:cNvSpPr>
+            <a:spLocks noGrp="1"/>
+          </p:cNvSpPr>
+          <p:nvPr>
+            <p:ph type="body" sz="quarter" idx="3"/>
+          </p:nvPr>
+        </p:nvSpPr>
+        <p:spPr>
+          <a:xfrm>
+            <a:off x="685800" y="4343400"/>
+            <a:ext cx="5486400" cy="4114800"/>
+          </a:xfrm>
+          <a:prstGeom prst="rect">
+            <a:avLst/>
+          </a:prstGeom>
+        </p:spPr>
+        <p:txBody>
+          <a:bodyPr vert="horz" lIns="91440" tIns="45720" rIns="91440" bIns="45720" rtlCol="0"/>
+          <a:lstStyle/>
+          <a:p>
+            <a:pPr lvl="0"/>
+            <a:r>
+              <a:rPr lang="en-US" smtClean="0"/>
+              <a:t>Click to edit Master text styles</a:t>
+            </a:r>
+          </a:p>
+          <a:p>
+            <a:pPr lvl="1"/>
+            <a:r>
+              <a:rPr lang="en-US" smtClean="0"/>
+              <a:t>Second level</a:t>
+            </a:r>
+          </a:p>
+          <a:p>
+            <a:pPr lvl="2"/>
+            <a:r>
+              <a:rPr lang="en-US" smtClean="0"/>
+              <a:t>Third level</a:t>
+            </a:r>
+          </a:p>
+          <a:p>
+            <a:pPr lvl="3"/>
+            <a:r>
+              <a:rPr lang="en-US" smtClean="0"/>
+              <a:t>Fourth level</a:t>
+            </a:r>
+          </a:p>
+          <a:p>
+            <a:pPr lvl="4"/>
+            <a:r>
+              <a:rPr lang="en-US" smtClean="0"/>
+              <a:t>Fifth level</a:t>
+            </a:r>
+            <a:endParaRPr lang="en-US"/>
+          </a:p>
+        </p:txBody>
+      </p:sp>
+      <p:sp>
+        <p:nvSpPr>
+          <p:cNvPr id="6" name="Footer Placeholder 5"/>
+          <p:cNvSpPr>
+            <a:spLocks noGrp="1"/>
+          </p:cNvSpPr>
+          <p:nvPr>
+            <p:ph type="ftr" sz="quarter" idx="4"/>
+          </p:nvPr>
+        </p:nvSpPr>
+        <p:spPr>
+          <a:xfrm>
+            <a:off x="0" y="8685213"/>
+            <a:ext cx="2971800" cy="457200"/>
+          </a:xfrm>
+          <a:prstGeom prst="rect">
+            <a:avLst/>
+          </a:prstGeom>
+        </p:spPr>
+        <p:txBody>
+          <a:bodyPr vert="horz" lIns="91440" tIns="45720" rIns="91440" bIns="45720" rtlCol="0" anchor="b"/>
+          <a:lstStyle>
+            <a:lvl1pPr algn="l">
+              <a:defRPr sz="1200"/>
+            </a:lvl1pPr>
+          </a:lstStyle>
+          <a:p>
+            <a:endParaRPr lang="en-US"/>
+          </a:p>
+        </p:txBody>
+      </p:sp>
+      <p:sp>
+        <p:nvSpPr>
+          <p:cNvPr id="7" name="Slide Number Placeholder 6"/>
+          <p:cNvSpPr>
+            <a:spLocks noGrp="1"/>
+          </p:cNvSpPr>
+          <p:nvPr>
+            <p:ph type="sldNum" sz="quarter" idx="5"/>
+          </p:nvPr>
+        </p:nvSpPr>
+        <p:spPr>
+          <a:xfrm>
+            <a:off x="3884613" y="8685213"/>
+            <a:ext cx="2971800" cy="457200"/>
+          </a:xfrm>
+          <a:prstGeom prst="rect">
+            <a:avLst/>
+          </a:prstGeom>
+        </p:spPr>
+        <p:txBody>
+          <a:bodyPr vert="horz" lIns="91440" tIns="45720" rIns="91440" bIns="45720" rtlCol="0" anchor="b"/>
+          <a:lstStyle>
+            <a:lvl1pPr algn="r">
+              <a:defRPr sz="1200"/>
+            </a:lvl1pPr>
+          </a:lstStyle>
+          <a:p>
+            <a:fld id="{9CED725A-1658-4778-83A2-2C6F7BDEAE16}" type="slidenum">
+              <a:rPr lang="en-US" smtClean="0"/>
+              <a:t>‹#›</a:t>
+            </a:fld>
+            <a:endParaRPr lang="en-US"/>
+          </a:p>
+        </p:txBody>
+      </p:sp>
+    </p:spTree>
+    <p:extLst>
+      <p:ext uri="{BB962C8B-B14F-4D97-AF65-F5344CB8AC3E}">
+        <p14:creationId xmlns:p14="http://schemas.microsoft.com/office/powerpoint/2010/main" val="2444789243"/>
+      </p:ext>
+    </p:extLst>
+  </p:cSld>
+  <p:clrMap bg1="lt1" tx1="dk1" bg2="lt2" tx2="dk2" accent1="accent1" accent2="accent2" accent3="accent3" accent4="accent4" accent5="accent5" accent6="accent6" hlink="hlink" folHlink="folHlink"/>
+  <p:notesStyle>
+    <a:lvl1pPr marL="0" algn="l" defTabSz="914400" rtl="0" eaLnBrk="1" latinLnBrk="0" hangingPunct="1">
+      <a:defRPr sz="1200" kern="1200">
+        <a:solidFill>
+          <a:schemeClr val="tx1"/>
+        </a:solidFill>
+        <a:latin typeface="+mn-lt"/>
+        <a:ea typeface="+mn-ea"/>
+        <a:cs typeface="+mn-cs"/>
+      </a:defRPr>
+    </a:lvl1pPr>
+    <a:lvl2pPr marL="457200" algn="l" defTabSz="914400" rtl="0" eaLnBrk="1" latinLnBrk="0" hangingPunct="1">
+      <a:defRPr sz="1200" kern="1200">
+        <a:solidFill>
+          <a:schemeClr val="tx1"/>
+        </a:solidFill>
+        <a:latin typeface="+mn-lt"/>
+        <a:ea typeface="+mn-ea"/>
+        <a:cs typeface="+mn-cs"/>
+      </a:defRPr>
+    </a:lvl2pPr>
+    <a:lvl3pPr marL="914400" algn="l" defTabSz="914400" rtl="0" eaLnBrk="1" latinLnBrk="0" hangingPunct="1">
+      <a:defRPr sz="1200" kern="1200">
+        <a:solidFill>
+          <a:schemeClr val="tx1"/>
+        </a:solidFill>
+        <a:latin typeface="+mn-lt"/>
+        <a:ea typeface="+mn-ea"/>
+        <a:cs typeface="+mn-cs"/>
+      </a:defRPr>
+    </a:lvl3pPr>
+    <a:lvl4pPr marL="1371600" algn="l" defTabSz="914400" rtl="0" eaLnBrk="1" latinLnBrk="0" hangingPunct="1">
+      <a:defRPr sz="1200" kern="1200">
+        <a:solidFill>
+          <a:schemeClr val="tx1"/>
+        </a:solidFill>
+        <a:latin typeface="+mn-lt"/>
+        <a:ea typeface="+mn-ea"/>
+        <a:cs typeface="+mn-cs"/>
+      </a:defRPr>
+    </a:lvl4pPr>
+    <a:lvl5pPr marL="1828800" algn="l" defTabSz="914400" rtl="0" eaLnBrk="1" latinLnBrk="0" hangingPunct="1">
+      <a:defRPr sz="1200" kern="1200">
+        <a:solidFill>
+          <a:schemeClr val="tx1"/>
+        </a:solidFill>
+        <a:latin typeface="+mn-lt"/>
+        <a:ea typeface="+mn-ea"/>
+        <a:cs typeface="+mn-cs"/>
+      </a:defRPr>
+    </a:lvl5pPr>
+    <a:lvl6pPr marL="2286000" algn="l" defTabSz="914400" rtl="0" eaLnBrk="1" latinLnBrk="0" hangingPunct="1">
+      <a:defRPr sz="1200" kern="1200">
+        <a:solidFill>
+          <a:schemeClr val="tx1"/>
+        </a:solidFill>
+        <a:latin typeface="+mn-lt"/>
+        <a:ea typeface="+mn-ea"/>
+        <a:cs typeface="+mn-cs"/>
+      </a:defRPr>
+    </a:lvl6pPr>
+    <a:lvl7pPr marL="2743200" algn="l" defTabSz="914400" rtl="0" eaLnBrk="1" latinLnBrk="0" hangingPunct="1">
+      <a:defRPr sz="1200" kern="1200">
+        <a:solidFill>
+          <a:schemeClr val="tx1"/>
+        </a:solidFill>
+        <a:latin typeface="+mn-lt"/>
+        <a:ea typeface="+mn-ea"/>
+        <a:cs typeface="+mn-cs"/>
+      </a:defRPr>
+    </a:lvl7pPr>
+    <a:lvl8pPr marL="3200400" algn="l" defTabSz="914400" rtl="0" eaLnBrk="1" latinLnBrk="0" hangingPunct="1">
+      <a:defRPr sz="1200" kern="1200">
+        <a:solidFill>
+          <a:schemeClr val="tx1"/>
+        </a:solidFill>
+        <a:latin typeface="+mn-lt"/>
+        <a:ea typeface="+mn-ea"/>
+        <a:cs typeface="+mn-cs"/>
+      </a:defRPr>
+    </a:lvl8pPr>
+    <a:lvl9pPr marL="3657600" algn="l" defTabSz="914400" rtl="0" eaLnBrk="1" latinLnBrk="0" hangingPunct="1">
+      <a:defRPr sz="1200" kern="1200">
+        <a:solidFill>
+          <a:schemeClr val="tx1"/>
+        </a:solidFill>
+        <a:latin typeface="+mn-lt"/>
+        <a:ea typeface="+mn-ea"/>
+        <a:cs typeface="+mn-cs"/>
+      </a:defRPr>
+    </a:lvl9pPr>
+  </p:notesStyle>
+</p:notesMaster>
+</file>
+
+<file path=ppt/notesSlides/notesSlide1.xml><?xml version="1.0" encoding="utf-8"?>
+<p:notes xmlns:a="http://schemas.openxmlformats.org/drawingml/2006/main" xmlns:r="http://schemas.openxmlformats.org/officeDocument/2006/relationships" xmlns:p="http://schemas.openxmlformats.org/presentationml/2006/main">
+  <p:cSld>
+    <p:spTree>
+      <p:nvGrpSpPr>
+        <p:cNvPr id="1" name=""/>
+        <p:cNvGrpSpPr/>
+        <p:nvPr/>
+      </p:nvGrpSpPr>
+      <p:grpSpPr>
+        <a:xfrm>
+          <a:off x="0" y="0"/>
+          <a:ext cx="0" cy="0"/>
+          <a:chOff x="0" y="0"/>
+          <a:chExt cx="0" cy="0"/>
+        </a:xfrm>
+      </p:grpSpPr>
+      <p:sp>
+        <p:nvSpPr>
+          <p:cNvPr id="2" name="Slide Image Placeholder 1"/>
+          <p:cNvSpPr>
+            <a:spLocks noGrp="1" noRot="1" noChangeAspect="1"/>
+          </p:cNvSpPr>
+          <p:nvPr>
+            <p:ph type="sldImg"/>
+          </p:nvPr>
+        </p:nvSpPr>
+        <p:spPr/>
+      </p:sp>
+      <p:sp>
+        <p:nvSpPr>
+          <p:cNvPr id="3" name="Notes Placeholder 2"/>
+          <p:cNvSpPr>
+            <a:spLocks noGrp="1"/>
+          </p:cNvSpPr>
+          <p:nvPr>
+            <p:ph type="body" idx="1"/>
+          </p:nvPr>
+        </p:nvSpPr>
+        <p:spPr/>
+        <p:txBody>
+          <a:bodyPr/>
+          <a:lstStyle/>
+          <a:p>
+            <a:endParaRPr lang="en-US"/>
+          </a:p>
+        </p:txBody>
+      </p:sp>
+      <p:sp>
+        <p:nvSpPr>
+          <p:cNvPr id="4" name="Slide Number Placeholder 3"/>
+          <p:cNvSpPr>
+            <a:spLocks noGrp="1"/>
+          </p:cNvSpPr>
+          <p:nvPr>
+            <p:ph type="sldNum" sz="quarter" idx="10"/>
+          </p:nvPr>
+        </p:nvSpPr>
+        <p:spPr/>
+        <p:txBody>
+          <a:bodyPr/>
+          <a:lstStyle/>
+          <a:p>
+            <a:fld id="{9CED725A-1658-4778-83A2-2C6F7BDEAE16}" type="slidenum">
+              <a:rPr lang="en-US" smtClean="0"/>
+              <a:t>1</a:t>
+            </a:fld>
+            <a:endParaRPr lang="en-US"/>
+          </a:p>
+        </p:txBody>
+      </p:sp>
+    </p:spTree>
+    <p:extLst>
+      <p:ext uri="{BB962C8B-B14F-4D97-AF65-F5344CB8AC3E}">
+        <p14:creationId xmlns:p14="http://schemas.microsoft.com/office/powerpoint/2010/main" val="3313777035"/>
+      </p:ext>
+    </p:extLst>
+  </p:cSld>
+  <p:clrMapOvr>
+    <a:masterClrMapping/>
+  </p:clrMapOvr>
+</p:notes>
+</file>
+
+<file path=ppt/notesSlides/notesSlide10.xml><?xml version="1.0" encoding="utf-8"?>
+<p:notes xmlns:a="http://schemas.openxmlformats.org/drawingml/2006/main" xmlns:r="http://schemas.openxmlformats.org/officeDocument/2006/relationships" xmlns:p="http://schemas.openxmlformats.org/presentationml/2006/main">
+  <p:cSld>
+    <p:spTree>
+      <p:nvGrpSpPr>
+        <p:cNvPr id="1" name=""/>
+        <p:cNvGrpSpPr/>
+        <p:nvPr/>
+      </p:nvGrpSpPr>
+      <p:grpSpPr>
+        <a:xfrm>
+          <a:off x="0" y="0"/>
+          <a:ext cx="0" cy="0"/>
+          <a:chOff x="0" y="0"/>
+          <a:chExt cx="0" cy="0"/>
+        </a:xfrm>
+      </p:grpSpPr>
+      <p:sp>
+        <p:nvSpPr>
+          <p:cNvPr id="2" name="Slide Image Placeholder 1"/>
+          <p:cNvSpPr>
+            <a:spLocks noGrp="1" noRot="1" noChangeAspect="1"/>
+          </p:cNvSpPr>
+          <p:nvPr>
+            <p:ph type="sldImg"/>
+          </p:nvPr>
+        </p:nvSpPr>
+        <p:spPr/>
+      </p:sp>
+      <p:sp>
+        <p:nvSpPr>
+          <p:cNvPr id="3" name="Notes Placeholder 2"/>
+          <p:cNvSpPr>
+            <a:spLocks noGrp="1"/>
+          </p:cNvSpPr>
+          <p:nvPr>
+            <p:ph type="body" idx="1"/>
+          </p:nvPr>
+        </p:nvSpPr>
+        <p:spPr/>
+        <p:txBody>
+          <a:bodyPr/>
+          <a:lstStyle/>
+          <a:p>
+            <a:endParaRPr lang="en-US"/>
+          </a:p>
+        </p:txBody>
+      </p:sp>
+      <p:sp>
+        <p:nvSpPr>
+          <p:cNvPr id="4" name="Slide Number Placeholder 3"/>
+          <p:cNvSpPr>
+            <a:spLocks noGrp="1"/>
+          </p:cNvSpPr>
+          <p:nvPr>
+            <p:ph type="sldNum" sz="quarter" idx="10"/>
+          </p:nvPr>
+        </p:nvSpPr>
+        <p:spPr/>
+        <p:txBody>
+          <a:bodyPr/>
+          <a:lstStyle/>
+          <a:p>
+            <a:fld id="{9CED725A-1658-4778-83A2-2C6F7BDEAE16}" type="slidenum">
+              <a:rPr lang="en-US" smtClean="0"/>
+              <a:t>10</a:t>
+            </a:fld>
+            <a:endParaRPr lang="en-US"/>
+          </a:p>
+        </p:txBody>
+      </p:sp>
+    </p:spTree>
+    <p:extLst>
+      <p:ext uri="{BB962C8B-B14F-4D97-AF65-F5344CB8AC3E}">
+        <p14:creationId xmlns:p14="http://schemas.microsoft.com/office/powerpoint/2010/main" val="3896518590"/>
+      </p:ext>
+    </p:extLst>
+  </p:cSld>
+  <p:clrMapOvr>
+    <a:masterClrMapping/>
+  </p:clrMapOvr>
+</p:notes>
+</file>
+
+<file path=ppt/notesSlides/notesSlide11.xml><?xml version="1.0" encoding="utf-8"?>
+<p:notes xmlns:a="http://schemas.openxmlformats.org/drawingml/2006/main" xmlns:r="http://schemas.openxmlformats.org/officeDocument/2006/relationships" xmlns:p="http://schemas.openxmlformats.org/presentationml/2006/main">
+  <p:cSld>
+    <p:spTree>
+      <p:nvGrpSpPr>
+        <p:cNvPr id="1" name=""/>
+        <p:cNvGrpSpPr/>
+        <p:nvPr/>
+      </p:nvGrpSpPr>
+      <p:grpSpPr>
+        <a:xfrm>
+          <a:off x="0" y="0"/>
+          <a:ext cx="0" cy="0"/>
+          <a:chOff x="0" y="0"/>
+          <a:chExt cx="0" cy="0"/>
+        </a:xfrm>
+      </p:grpSpPr>
+      <p:sp>
+        <p:nvSpPr>
+          <p:cNvPr id="2" name="Slide Image Placeholder 1"/>
+          <p:cNvSpPr>
+            <a:spLocks noGrp="1" noRot="1" noChangeAspect="1"/>
+          </p:cNvSpPr>
+          <p:nvPr>
+            <p:ph type="sldImg"/>
+          </p:nvPr>
+        </p:nvSpPr>
+        <p:spPr/>
+      </p:sp>
+      <p:sp>
+        <p:nvSpPr>
+          <p:cNvPr id="3" name="Notes Placeholder 2"/>
+          <p:cNvSpPr>
+            <a:spLocks noGrp="1"/>
+          </p:cNvSpPr>
+          <p:nvPr>
+            <p:ph type="body" idx="1"/>
+          </p:nvPr>
+        </p:nvSpPr>
+        <p:spPr/>
+        <p:txBody>
+          <a:bodyPr/>
+          <a:lstStyle/>
+          <a:p>
+            <a:endParaRPr lang="en-US"/>
+          </a:p>
+        </p:txBody>
+      </p:sp>
+      <p:sp>
+        <p:nvSpPr>
+          <p:cNvPr id="4" name="Slide Number Placeholder 3"/>
+          <p:cNvSpPr>
+            <a:spLocks noGrp="1"/>
+          </p:cNvSpPr>
+          <p:nvPr>
+            <p:ph type="sldNum" sz="quarter" idx="10"/>
+          </p:nvPr>
+        </p:nvSpPr>
+        <p:spPr/>
+        <p:txBody>
+          <a:bodyPr/>
+          <a:lstStyle/>
+          <a:p>
+            <a:fld id="{9CED725A-1658-4778-83A2-2C6F7BDEAE16}" type="slidenum">
+              <a:rPr lang="en-US" smtClean="0"/>
+              <a:t>11</a:t>
+            </a:fld>
+            <a:endParaRPr lang="en-US"/>
+          </a:p>
+        </p:txBody>
+      </p:sp>
+    </p:spTree>
+    <p:extLst>
+      <p:ext uri="{BB962C8B-B14F-4D97-AF65-F5344CB8AC3E}">
+        <p14:creationId xmlns:p14="http://schemas.microsoft.com/office/powerpoint/2010/main" val="2821467748"/>
+      </p:ext>
+    </p:extLst>
+  </p:cSld>
+  <p:clrMapOvr>
+    <a:masterClrMapping/>
+  </p:clrMapOvr>
+</p:notes>
+</file>
+
+<file path=ppt/notesSlides/notesSlide12.xml><?xml version="1.0" encoding="utf-8"?>
+<p:notes xmlns:a="http://schemas.openxmlformats.org/drawingml/2006/main" xmlns:r="http://schemas.openxmlformats.org/officeDocument/2006/relationships" xmlns:p="http://schemas.openxmlformats.org/presentationml/2006/main">
+  <p:cSld>
+    <p:spTree>
+      <p:nvGrpSpPr>
+        <p:cNvPr id="1" name=""/>
+        <p:cNvGrpSpPr/>
+        <p:nvPr/>
+      </p:nvGrpSpPr>
+      <p:grpSpPr>
+        <a:xfrm>
+          <a:off x="0" y="0"/>
+          <a:ext cx="0" cy="0"/>
+          <a:chOff x="0" y="0"/>
+          <a:chExt cx="0" cy="0"/>
+        </a:xfrm>
+      </p:grpSpPr>
+      <p:sp>
+        <p:nvSpPr>
+          <p:cNvPr id="2" name="Slide Image Placeholder 1"/>
+          <p:cNvSpPr>
+            <a:spLocks noGrp="1" noRot="1" noChangeAspect="1"/>
+          </p:cNvSpPr>
+          <p:nvPr>
+            <p:ph type="sldImg"/>
+          </p:nvPr>
+        </p:nvSpPr>
+        <p:spPr/>
+      </p:sp>
+      <p:sp>
+        <p:nvSpPr>
+          <p:cNvPr id="3" name="Notes Placeholder 2"/>
+          <p:cNvSpPr>
+            <a:spLocks noGrp="1"/>
+          </p:cNvSpPr>
+          <p:nvPr>
+            <p:ph type="body" idx="1"/>
+          </p:nvPr>
+        </p:nvSpPr>
+        <p:spPr/>
+        <p:txBody>
+          <a:bodyPr/>
+          <a:lstStyle/>
+          <a:p>
+            <a:endParaRPr lang="en-US"/>
+          </a:p>
+        </p:txBody>
+      </p:sp>
+      <p:sp>
+        <p:nvSpPr>
+          <p:cNvPr id="4" name="Slide Number Placeholder 3"/>
+          <p:cNvSpPr>
+            <a:spLocks noGrp="1"/>
+          </p:cNvSpPr>
+          <p:nvPr>
+            <p:ph type="sldNum" sz="quarter" idx="10"/>
+          </p:nvPr>
+        </p:nvSpPr>
+        <p:spPr/>
+        <p:txBody>
+          <a:bodyPr/>
+          <a:lstStyle/>
+          <a:p>
+            <a:fld id="{36FA9263-D405-4C86-B0D4-4111C2B5E19F}" type="slidenum">
+              <a:rPr lang="de-DE" smtClean="0"/>
+              <a:t>12</a:t>
+            </a:fld>
+            <a:endParaRPr lang="de-DE"/>
+          </a:p>
+        </p:txBody>
+      </p:sp>
+    </p:spTree>
+    <p:extLst>
+      <p:ext uri="{BB962C8B-B14F-4D97-AF65-F5344CB8AC3E}">
+        <p14:creationId xmlns:p14="http://schemas.microsoft.com/office/powerpoint/2010/main" val="1015209409"/>
+      </p:ext>
+    </p:extLst>
+  </p:cSld>
+  <p:clrMapOvr>
+    <a:masterClrMapping/>
+  </p:clrMapOvr>
+</p:notes>
+</file>
+
+<file path=ppt/notesSlides/notesSlide13.xml><?xml version="1.0" encoding="utf-8"?>
+<p:notes xmlns:a="http://schemas.openxmlformats.org/drawingml/2006/main" xmlns:r="http://schemas.openxmlformats.org/officeDocument/2006/relationships" xmlns:p="http://schemas.openxmlformats.org/presentationml/2006/main">
+  <p:cSld>
+    <p:spTree>
+      <p:nvGrpSpPr>
+        <p:cNvPr id="1" name=""/>
+        <p:cNvGrpSpPr/>
+        <p:nvPr/>
+      </p:nvGrpSpPr>
+      <p:grpSpPr>
+        <a:xfrm>
+          <a:off x="0" y="0"/>
+          <a:ext cx="0" cy="0"/>
+          <a:chOff x="0" y="0"/>
+          <a:chExt cx="0" cy="0"/>
+        </a:xfrm>
+      </p:grpSpPr>
+      <p:sp>
+        <p:nvSpPr>
+          <p:cNvPr id="2" name="Slide Image Placeholder 1"/>
+          <p:cNvSpPr>
+            <a:spLocks noGrp="1" noRot="1" noChangeAspect="1"/>
+          </p:cNvSpPr>
+          <p:nvPr>
+            <p:ph type="sldImg"/>
+          </p:nvPr>
+        </p:nvSpPr>
+        <p:spPr/>
+      </p:sp>
+      <p:sp>
+        <p:nvSpPr>
+          <p:cNvPr id="3" name="Notes Placeholder 2"/>
+          <p:cNvSpPr>
+            <a:spLocks noGrp="1"/>
+          </p:cNvSpPr>
+          <p:nvPr>
+            <p:ph type="body" idx="1"/>
+          </p:nvPr>
+        </p:nvSpPr>
+        <p:spPr/>
+        <p:txBody>
+          <a:bodyPr/>
+          <a:lstStyle/>
+          <a:p>
+            <a:endParaRPr lang="en-US"/>
+          </a:p>
+        </p:txBody>
+      </p:sp>
+      <p:sp>
+        <p:nvSpPr>
+          <p:cNvPr id="4" name="Slide Number Placeholder 3"/>
+          <p:cNvSpPr>
+            <a:spLocks noGrp="1"/>
+          </p:cNvSpPr>
+          <p:nvPr>
+            <p:ph type="sldNum" sz="quarter" idx="10"/>
+          </p:nvPr>
+        </p:nvSpPr>
+        <p:spPr/>
+        <p:txBody>
+          <a:bodyPr/>
+          <a:lstStyle/>
+          <a:p>
+            <a:fld id="{36FA9263-D405-4C86-B0D4-4111C2B5E19F}" type="slidenum">
+              <a:rPr lang="de-DE" smtClean="0"/>
+              <a:t>13</a:t>
+            </a:fld>
+            <a:endParaRPr lang="de-DE"/>
+          </a:p>
+        </p:txBody>
+      </p:sp>
+    </p:spTree>
+    <p:extLst>
+      <p:ext uri="{BB962C8B-B14F-4D97-AF65-F5344CB8AC3E}">
+        <p14:creationId xmlns:p14="http://schemas.microsoft.com/office/powerpoint/2010/main" val="1015209409"/>
+      </p:ext>
+    </p:extLst>
+  </p:cSld>
+  <p:clrMapOvr>
+    <a:masterClrMapping/>
+  </p:clrMapOvr>
+</p:notes>
+</file>
+
+<file path=ppt/notesSlides/notesSlide2.xml><?xml version="1.0" encoding="utf-8"?>
+<p:notes xmlns:a="http://schemas.openxmlformats.org/drawingml/2006/main" xmlns:r="http://schemas.openxmlformats.org/officeDocument/2006/relationships" xmlns:p="http://schemas.openxmlformats.org/presentationml/2006/main">
+  <p:cSld>
+    <p:spTree>
+      <p:nvGrpSpPr>
+        <p:cNvPr id="1" name=""/>
+        <p:cNvGrpSpPr/>
+        <p:nvPr/>
+      </p:nvGrpSpPr>
+      <p:grpSpPr>
+        <a:xfrm>
+          <a:off x="0" y="0"/>
+          <a:ext cx="0" cy="0"/>
+          <a:chOff x="0" y="0"/>
+          <a:chExt cx="0" cy="0"/>
+        </a:xfrm>
+      </p:grpSpPr>
+      <p:sp>
+        <p:nvSpPr>
+          <p:cNvPr id="2" name="Slide Image Placeholder 1"/>
+          <p:cNvSpPr>
+            <a:spLocks noGrp="1" noRot="1" noChangeAspect="1"/>
+          </p:cNvSpPr>
+          <p:nvPr>
+            <p:ph type="sldImg"/>
+          </p:nvPr>
+        </p:nvSpPr>
+        <p:spPr/>
+      </p:sp>
+      <p:sp>
+        <p:nvSpPr>
+          <p:cNvPr id="3" name="Notes Placeholder 2"/>
+          <p:cNvSpPr>
+            <a:spLocks noGrp="1"/>
+          </p:cNvSpPr>
+          <p:nvPr>
+            <p:ph type="body" idx="1"/>
+          </p:nvPr>
+        </p:nvSpPr>
+        <p:spPr/>
+        <p:txBody>
+          <a:bodyPr/>
+          <a:lstStyle/>
+          <a:p>
+            <a:endParaRPr lang="en-US"/>
+          </a:p>
+        </p:txBody>
+      </p:sp>
+      <p:sp>
+        <p:nvSpPr>
+          <p:cNvPr id="4" name="Slide Number Placeholder 3"/>
+          <p:cNvSpPr>
+            <a:spLocks noGrp="1"/>
+          </p:cNvSpPr>
+          <p:nvPr>
+            <p:ph type="sldNum" sz="quarter" idx="10"/>
+          </p:nvPr>
+        </p:nvSpPr>
+        <p:spPr/>
+        <p:txBody>
+          <a:bodyPr/>
+          <a:lstStyle/>
+          <a:p>
+            <a:fld id="{9CED725A-1658-4778-83A2-2C6F7BDEAE16}" type="slidenum">
+              <a:rPr lang="en-US" smtClean="0"/>
+              <a:t>2</a:t>
+            </a:fld>
+            <a:endParaRPr lang="en-US"/>
+          </a:p>
+        </p:txBody>
+      </p:sp>
+    </p:spTree>
+    <p:extLst>
+      <p:ext uri="{BB962C8B-B14F-4D97-AF65-F5344CB8AC3E}">
+        <p14:creationId xmlns:p14="http://schemas.microsoft.com/office/powerpoint/2010/main" val="1752112989"/>
+      </p:ext>
+    </p:extLst>
+  </p:cSld>
+  <p:clrMapOvr>
+    <a:masterClrMapping/>
+  </p:clrMapOvr>
+</p:notes>
+</file>
+
+<file path=ppt/notesSlides/notesSlide3.xml><?xml version="1.0" encoding="utf-8"?>
+<p:notes xmlns:a="http://schemas.openxmlformats.org/drawingml/2006/main" xmlns:r="http://schemas.openxmlformats.org/officeDocument/2006/relationships" xmlns:p="http://schemas.openxmlformats.org/presentationml/2006/main">
+  <p:cSld>
+    <p:spTree>
+      <p:nvGrpSpPr>
+        <p:cNvPr id="1" name=""/>
+        <p:cNvGrpSpPr/>
+        <p:nvPr/>
+      </p:nvGrpSpPr>
+      <p:grpSpPr>
+        <a:xfrm>
+          <a:off x="0" y="0"/>
+          <a:ext cx="0" cy="0"/>
+          <a:chOff x="0" y="0"/>
+          <a:chExt cx="0" cy="0"/>
+        </a:xfrm>
+      </p:grpSpPr>
+      <p:sp>
+        <p:nvSpPr>
+          <p:cNvPr id="2" name="Slide Image Placeholder 1"/>
+          <p:cNvSpPr>
+            <a:spLocks noGrp="1" noRot="1" noChangeAspect="1"/>
+          </p:cNvSpPr>
+          <p:nvPr>
+            <p:ph type="sldImg"/>
+          </p:nvPr>
+        </p:nvSpPr>
+        <p:spPr/>
+      </p:sp>
+      <p:sp>
+        <p:nvSpPr>
+          <p:cNvPr id="3" name="Notes Placeholder 2"/>
+          <p:cNvSpPr>
+            <a:spLocks noGrp="1"/>
+          </p:cNvSpPr>
+          <p:nvPr>
+            <p:ph type="body" idx="1"/>
+          </p:nvPr>
+        </p:nvSpPr>
+        <p:spPr/>
+        <p:txBody>
+          <a:bodyPr/>
+          <a:lstStyle/>
+          <a:p>
+            <a:endParaRPr lang="de-DE" dirty="0"/>
+          </a:p>
+        </p:txBody>
+      </p:sp>
+      <p:sp>
+        <p:nvSpPr>
+          <p:cNvPr id="4" name="Slide Number Placeholder 3"/>
+          <p:cNvSpPr>
+            <a:spLocks noGrp="1"/>
+          </p:cNvSpPr>
+          <p:nvPr>
+            <p:ph type="sldNum" sz="quarter" idx="10"/>
+          </p:nvPr>
+        </p:nvSpPr>
+        <p:spPr/>
+        <p:txBody>
+          <a:bodyPr/>
+          <a:lstStyle/>
+          <a:p>
+            <a:fld id="{36FA9263-D405-4C86-B0D4-4111C2B5E19F}" type="slidenum">
+              <a:rPr lang="de-DE" smtClean="0"/>
+              <a:t>3</a:t>
+            </a:fld>
+            <a:endParaRPr lang="de-DE"/>
+          </a:p>
+        </p:txBody>
+      </p:sp>
+    </p:spTree>
+    <p:extLst>
+      <p:ext uri="{BB962C8B-B14F-4D97-AF65-F5344CB8AC3E}">
+        <p14:creationId xmlns:p14="http://schemas.microsoft.com/office/powerpoint/2010/main" val="1271329113"/>
+      </p:ext>
+    </p:extLst>
+  </p:cSld>
+  <p:clrMapOvr>
+    <a:masterClrMapping/>
+  </p:clrMapOvr>
+</p:notes>
+</file>
+
+<file path=ppt/notesSlides/notesSlide4.xml><?xml version="1.0" encoding="utf-8"?>
+<p:notes xmlns:a="http://schemas.openxmlformats.org/drawingml/2006/main" xmlns:r="http://schemas.openxmlformats.org/officeDocument/2006/relationships" xmlns:p="http://schemas.openxmlformats.org/presentationml/2006/main">
+  <p:cSld>
+    <p:spTree>
+      <p:nvGrpSpPr>
+        <p:cNvPr id="1" name=""/>
+        <p:cNvGrpSpPr/>
+        <p:nvPr/>
+      </p:nvGrpSpPr>
+      <p:grpSpPr>
+        <a:xfrm>
+          <a:off x="0" y="0"/>
+          <a:ext cx="0" cy="0"/>
+          <a:chOff x="0" y="0"/>
+          <a:chExt cx="0" cy="0"/>
+        </a:xfrm>
+      </p:grpSpPr>
+      <p:sp>
+        <p:nvSpPr>
+          <p:cNvPr id="2" name="Slide Image Placeholder 1"/>
+          <p:cNvSpPr>
+            <a:spLocks noGrp="1" noRot="1" noChangeAspect="1"/>
+          </p:cNvSpPr>
+          <p:nvPr>
+            <p:ph type="sldImg"/>
+          </p:nvPr>
+        </p:nvSpPr>
+        <p:spPr/>
+      </p:sp>
+      <p:sp>
+        <p:nvSpPr>
+          <p:cNvPr id="3" name="Notes Placeholder 2"/>
+          <p:cNvSpPr>
+            <a:spLocks noGrp="1"/>
+          </p:cNvSpPr>
+          <p:nvPr>
+            <p:ph type="body" idx="1"/>
+          </p:nvPr>
+        </p:nvSpPr>
+        <p:spPr/>
+        <p:txBody>
+          <a:bodyPr/>
+          <a:lstStyle/>
+          <a:p>
+            <a:endParaRPr lang="en-US"/>
+          </a:p>
+        </p:txBody>
+      </p:sp>
+      <p:sp>
+        <p:nvSpPr>
+          <p:cNvPr id="4" name="Slide Number Placeholder 3"/>
+          <p:cNvSpPr>
+            <a:spLocks noGrp="1"/>
+          </p:cNvSpPr>
+          <p:nvPr>
+            <p:ph type="sldNum" sz="quarter" idx="10"/>
+          </p:nvPr>
+        </p:nvSpPr>
+        <p:spPr/>
+        <p:txBody>
+          <a:bodyPr/>
+          <a:lstStyle/>
+          <a:p>
+            <a:fld id="{36FA9263-D405-4C86-B0D4-4111C2B5E19F}" type="slidenum">
+              <a:rPr lang="de-DE" smtClean="0"/>
+              <a:t>4</a:t>
+            </a:fld>
+            <a:endParaRPr lang="de-DE"/>
+          </a:p>
+        </p:txBody>
+      </p:sp>
+    </p:spTree>
+    <p:extLst>
+      <p:ext uri="{BB962C8B-B14F-4D97-AF65-F5344CB8AC3E}">
+        <p14:creationId xmlns:p14="http://schemas.microsoft.com/office/powerpoint/2010/main" val="1921360121"/>
+      </p:ext>
+    </p:extLst>
+  </p:cSld>
+  <p:clrMapOvr>
+    <a:masterClrMapping/>
+  </p:clrMapOvr>
+</p:notes>
+</file>
+
+<file path=ppt/notesSlides/notesSlide5.xml><?xml version="1.0" encoding="utf-8"?>
+<p:notes xmlns:a="http://schemas.openxmlformats.org/drawingml/2006/main" xmlns:r="http://schemas.openxmlformats.org/officeDocument/2006/relationships" xmlns:p="http://schemas.openxmlformats.org/presentationml/2006/main">
+  <p:cSld>
+    <p:spTree>
+      <p:nvGrpSpPr>
+        <p:cNvPr id="1" name=""/>
+        <p:cNvGrpSpPr/>
+        <p:nvPr/>
+      </p:nvGrpSpPr>
+      <p:grpSpPr>
+        <a:xfrm>
+          <a:off x="0" y="0"/>
+          <a:ext cx="0" cy="0"/>
+          <a:chOff x="0" y="0"/>
+          <a:chExt cx="0" cy="0"/>
+        </a:xfrm>
+      </p:grpSpPr>
+      <p:sp>
+        <p:nvSpPr>
+          <p:cNvPr id="2" name="Slide Image Placeholder 1"/>
+          <p:cNvSpPr>
+            <a:spLocks noGrp="1" noRot="1" noChangeAspect="1"/>
+          </p:cNvSpPr>
+          <p:nvPr>
+            <p:ph type="sldImg"/>
+          </p:nvPr>
+        </p:nvSpPr>
+        <p:spPr/>
+      </p:sp>
+      <p:sp>
+        <p:nvSpPr>
+          <p:cNvPr id="3" name="Notes Placeholder 2"/>
+          <p:cNvSpPr>
+            <a:spLocks noGrp="1"/>
+          </p:cNvSpPr>
+          <p:nvPr>
+            <p:ph type="body" idx="1"/>
+          </p:nvPr>
+        </p:nvSpPr>
+        <p:spPr/>
+        <p:txBody>
+          <a:bodyPr/>
+          <a:lstStyle/>
+          <a:p>
+            <a:endParaRPr lang="en-US"/>
+          </a:p>
+        </p:txBody>
+      </p:sp>
+      <p:sp>
+        <p:nvSpPr>
+          <p:cNvPr id="4" name="Slide Number Placeholder 3"/>
+          <p:cNvSpPr>
+            <a:spLocks noGrp="1"/>
+          </p:cNvSpPr>
+          <p:nvPr>
+            <p:ph type="sldNum" sz="quarter" idx="10"/>
+          </p:nvPr>
+        </p:nvSpPr>
+        <p:spPr/>
+        <p:txBody>
+          <a:bodyPr/>
+          <a:lstStyle/>
+          <a:p>
+            <a:fld id="{36FA9263-D405-4C86-B0D4-4111C2B5E19F}" type="slidenum">
+              <a:rPr lang="de-DE" smtClean="0"/>
+              <a:t>5</a:t>
+            </a:fld>
+            <a:endParaRPr lang="de-DE"/>
+          </a:p>
+        </p:txBody>
+      </p:sp>
+    </p:spTree>
+    <p:extLst>
+      <p:ext uri="{BB962C8B-B14F-4D97-AF65-F5344CB8AC3E}">
+        <p14:creationId xmlns:p14="http://schemas.microsoft.com/office/powerpoint/2010/main" val="1921360121"/>
+      </p:ext>
+    </p:extLst>
+  </p:cSld>
+  <p:clrMapOvr>
+    <a:masterClrMapping/>
+  </p:clrMapOvr>
+</p:notes>
+</file>
+
+<file path=ppt/notesSlides/notesSlide6.xml><?xml version="1.0" encoding="utf-8"?>
+<p:notes xmlns:a="http://schemas.openxmlformats.org/drawingml/2006/main" xmlns:r="http://schemas.openxmlformats.org/officeDocument/2006/relationships" xmlns:p="http://schemas.openxmlformats.org/presentationml/2006/main">
+  <p:cSld>
+    <p:spTree>
+      <p:nvGrpSpPr>
+        <p:cNvPr id="1" name=""/>
+        <p:cNvGrpSpPr/>
+        <p:nvPr/>
+      </p:nvGrpSpPr>
+      <p:grpSpPr>
+        <a:xfrm>
+          <a:off x="0" y="0"/>
+          <a:ext cx="0" cy="0"/>
+          <a:chOff x="0" y="0"/>
+          <a:chExt cx="0" cy="0"/>
+        </a:xfrm>
+      </p:grpSpPr>
+      <p:sp>
+        <p:nvSpPr>
+          <p:cNvPr id="2" name="Slide Image Placeholder 1"/>
+          <p:cNvSpPr>
+            <a:spLocks noGrp="1" noRot="1" noChangeAspect="1"/>
+          </p:cNvSpPr>
+          <p:nvPr>
+            <p:ph type="sldImg"/>
+          </p:nvPr>
+        </p:nvSpPr>
+        <p:spPr/>
+      </p:sp>
+      <p:sp>
+        <p:nvSpPr>
+          <p:cNvPr id="3" name="Notes Placeholder 2"/>
+          <p:cNvSpPr>
+            <a:spLocks noGrp="1"/>
+          </p:cNvSpPr>
+          <p:nvPr>
+            <p:ph type="body" idx="1"/>
+          </p:nvPr>
+        </p:nvSpPr>
+        <p:spPr/>
+        <p:txBody>
+          <a:bodyPr/>
+          <a:lstStyle/>
+          <a:p>
+            <a:endParaRPr lang="en-US"/>
+          </a:p>
+        </p:txBody>
+      </p:sp>
+      <p:sp>
+        <p:nvSpPr>
+          <p:cNvPr id="4" name="Slide Number Placeholder 3"/>
+          <p:cNvSpPr>
+            <a:spLocks noGrp="1"/>
+          </p:cNvSpPr>
+          <p:nvPr>
+            <p:ph type="sldNum" sz="quarter" idx="10"/>
+          </p:nvPr>
+        </p:nvSpPr>
+        <p:spPr/>
+        <p:txBody>
+          <a:bodyPr/>
+          <a:lstStyle/>
+          <a:p>
+            <a:fld id="{36FA9263-D405-4C86-B0D4-4111C2B5E19F}" type="slidenum">
+              <a:rPr lang="de-DE" smtClean="0"/>
+              <a:t>6</a:t>
+            </a:fld>
+            <a:endParaRPr lang="de-DE"/>
+          </a:p>
+        </p:txBody>
+      </p:sp>
+    </p:spTree>
+    <p:extLst>
+      <p:ext uri="{BB962C8B-B14F-4D97-AF65-F5344CB8AC3E}">
+        <p14:creationId xmlns:p14="http://schemas.microsoft.com/office/powerpoint/2010/main" val="1921360121"/>
+      </p:ext>
+    </p:extLst>
+  </p:cSld>
+  <p:clrMapOvr>
+    <a:masterClrMapping/>
+  </p:clrMapOvr>
+</p:notes>
+</file>
+
+<file path=ppt/notesSlides/notesSlide7.xml><?xml version="1.0" encoding="utf-8"?>
+<p:notes xmlns:a="http://schemas.openxmlformats.org/drawingml/2006/main" xmlns:r="http://schemas.openxmlformats.org/officeDocument/2006/relationships" xmlns:p="http://schemas.openxmlformats.org/presentationml/2006/main">
+  <p:cSld>
+    <p:spTree>
+      <p:nvGrpSpPr>
+        <p:cNvPr id="1" name=""/>
+        <p:cNvGrpSpPr/>
+        <p:nvPr/>
+      </p:nvGrpSpPr>
+      <p:grpSpPr>
+        <a:xfrm>
+          <a:off x="0" y="0"/>
+          <a:ext cx="0" cy="0"/>
+          <a:chOff x="0" y="0"/>
+          <a:chExt cx="0" cy="0"/>
+        </a:xfrm>
+      </p:grpSpPr>
+      <p:sp>
+        <p:nvSpPr>
+          <p:cNvPr id="2" name="Slide Image Placeholder 1"/>
+          <p:cNvSpPr>
+            <a:spLocks noGrp="1" noRot="1" noChangeAspect="1"/>
+          </p:cNvSpPr>
+          <p:nvPr>
+            <p:ph type="sldImg"/>
+          </p:nvPr>
+        </p:nvSpPr>
+        <p:spPr/>
+      </p:sp>
+      <p:sp>
+        <p:nvSpPr>
+          <p:cNvPr id="3" name="Notes Placeholder 2"/>
+          <p:cNvSpPr>
+            <a:spLocks noGrp="1"/>
+          </p:cNvSpPr>
+          <p:nvPr>
+            <p:ph type="body" idx="1"/>
+          </p:nvPr>
+        </p:nvSpPr>
+        <p:spPr/>
+        <p:txBody>
+          <a:bodyPr/>
+          <a:lstStyle/>
+          <a:p>
+            <a:endParaRPr lang="en-US"/>
+          </a:p>
+        </p:txBody>
+      </p:sp>
+      <p:sp>
+        <p:nvSpPr>
+          <p:cNvPr id="4" name="Slide Number Placeholder 3"/>
+          <p:cNvSpPr>
+            <a:spLocks noGrp="1"/>
+          </p:cNvSpPr>
+          <p:nvPr>
+            <p:ph type="sldNum" sz="quarter" idx="10"/>
+          </p:nvPr>
+        </p:nvSpPr>
+        <p:spPr/>
+        <p:txBody>
+          <a:bodyPr/>
+          <a:lstStyle/>
+          <a:p>
+            <a:fld id="{9CED725A-1658-4778-83A2-2C6F7BDEAE16}" type="slidenum">
+              <a:rPr lang="en-US" smtClean="0"/>
+              <a:t>7</a:t>
+            </a:fld>
+            <a:endParaRPr lang="en-US"/>
+          </a:p>
+        </p:txBody>
+      </p:sp>
+    </p:spTree>
+    <p:extLst>
+      <p:ext uri="{BB962C8B-B14F-4D97-AF65-F5344CB8AC3E}">
+        <p14:creationId xmlns:p14="http://schemas.microsoft.com/office/powerpoint/2010/main" val="3406004542"/>
+      </p:ext>
+    </p:extLst>
+  </p:cSld>
+  <p:clrMapOvr>
+    <a:masterClrMapping/>
+  </p:clrMapOvr>
+</p:notes>
+</file>
+
+<file path=ppt/notesSlides/notesSlide8.xml><?xml version="1.0" encoding="utf-8"?>
+<p:notes xmlns:a="http://schemas.openxmlformats.org/drawingml/2006/main" xmlns:r="http://schemas.openxmlformats.org/officeDocument/2006/relationships" xmlns:p="http://schemas.openxmlformats.org/presentationml/2006/main">
+  <p:cSld>
+    <p:spTree>
+      <p:nvGrpSpPr>
+        <p:cNvPr id="1" name=""/>
+        <p:cNvGrpSpPr/>
+        <p:nvPr/>
+      </p:nvGrpSpPr>
+      <p:grpSpPr>
+        <a:xfrm>
+          <a:off x="0" y="0"/>
+          <a:ext cx="0" cy="0"/>
+          <a:chOff x="0" y="0"/>
+          <a:chExt cx="0" cy="0"/>
+        </a:xfrm>
+      </p:grpSpPr>
+      <p:sp>
+        <p:nvSpPr>
+          <p:cNvPr id="2" name="Slide Image Placeholder 1"/>
+          <p:cNvSpPr>
+            <a:spLocks noGrp="1" noRot="1" noChangeAspect="1"/>
+          </p:cNvSpPr>
+          <p:nvPr>
+            <p:ph type="sldImg"/>
+          </p:nvPr>
+        </p:nvSpPr>
+        <p:spPr/>
+      </p:sp>
+      <p:sp>
+        <p:nvSpPr>
+          <p:cNvPr id="3" name="Notes Placeholder 2"/>
+          <p:cNvSpPr>
+            <a:spLocks noGrp="1"/>
+          </p:cNvSpPr>
+          <p:nvPr>
+            <p:ph type="body" idx="1"/>
+          </p:nvPr>
+        </p:nvSpPr>
+        <p:spPr/>
+        <p:txBody>
+          <a:bodyPr/>
+          <a:lstStyle/>
+          <a:p>
+            <a:endParaRPr lang="en-US"/>
+          </a:p>
+        </p:txBody>
+      </p:sp>
+      <p:sp>
+        <p:nvSpPr>
+          <p:cNvPr id="4" name="Slide Number Placeholder 3"/>
+          <p:cNvSpPr>
+            <a:spLocks noGrp="1"/>
+          </p:cNvSpPr>
+          <p:nvPr>
+            <p:ph type="sldNum" sz="quarter" idx="10"/>
+          </p:nvPr>
+        </p:nvSpPr>
+        <p:spPr/>
+        <p:txBody>
+          <a:bodyPr/>
+          <a:lstStyle/>
+          <a:p>
+            <a:fld id="{9CED725A-1658-4778-83A2-2C6F7BDEAE16}" type="slidenum">
+              <a:rPr lang="en-US" smtClean="0"/>
+              <a:t>8</a:t>
+            </a:fld>
+            <a:endParaRPr lang="en-US"/>
+          </a:p>
+        </p:txBody>
+      </p:sp>
+    </p:spTree>
+    <p:extLst>
+      <p:ext uri="{BB962C8B-B14F-4D97-AF65-F5344CB8AC3E}">
+        <p14:creationId xmlns:p14="http://schemas.microsoft.com/office/powerpoint/2010/main" val="287104532"/>
+      </p:ext>
+    </p:extLst>
+  </p:cSld>
+  <p:clrMapOvr>
+    <a:masterClrMapping/>
+  </p:clrMapOvr>
+</p:notes>
+</file>
+
+<file path=ppt/notesSlides/notesSlide9.xml><?xml version="1.0" encoding="utf-8"?>
+<p:notes xmlns:a="http://schemas.openxmlformats.org/drawingml/2006/main" xmlns:r="http://schemas.openxmlformats.org/officeDocument/2006/relationships" xmlns:p="http://schemas.openxmlformats.org/presentationml/2006/main">
+  <p:cSld>
+    <p:spTree>
+      <p:nvGrpSpPr>
+        <p:cNvPr id="1" name=""/>
+        <p:cNvGrpSpPr/>
+        <p:nvPr/>
+      </p:nvGrpSpPr>
+      <p:grpSpPr>
+        <a:xfrm>
+          <a:off x="0" y="0"/>
+          <a:ext cx="0" cy="0"/>
+          <a:chOff x="0" y="0"/>
+          <a:chExt cx="0" cy="0"/>
+        </a:xfrm>
+      </p:grpSpPr>
+      <p:sp>
+        <p:nvSpPr>
+          <p:cNvPr id="2" name="Slide Image Placeholder 1"/>
+          <p:cNvSpPr>
+            <a:spLocks noGrp="1" noRot="1" noChangeAspect="1"/>
+          </p:cNvSpPr>
+          <p:nvPr>
+            <p:ph type="sldImg"/>
+          </p:nvPr>
+        </p:nvSpPr>
+        <p:spPr/>
+      </p:sp>
+      <p:sp>
+        <p:nvSpPr>
+          <p:cNvPr id="3" name="Notes Placeholder 2"/>
+          <p:cNvSpPr>
+            <a:spLocks noGrp="1"/>
+          </p:cNvSpPr>
+          <p:nvPr>
+            <p:ph type="body" idx="1"/>
+          </p:nvPr>
+        </p:nvSpPr>
+        <p:spPr/>
+        <p:txBody>
+          <a:bodyPr/>
+          <a:lstStyle/>
+          <a:p>
+            <a:endParaRPr lang="en-US"/>
+          </a:p>
+        </p:txBody>
+      </p:sp>
+      <p:sp>
+        <p:nvSpPr>
+          <p:cNvPr id="4" name="Slide Number Placeholder 3"/>
+          <p:cNvSpPr>
+            <a:spLocks noGrp="1"/>
+          </p:cNvSpPr>
+          <p:nvPr>
+            <p:ph type="sldNum" sz="quarter" idx="10"/>
+          </p:nvPr>
+        </p:nvSpPr>
+        <p:spPr/>
+        <p:txBody>
+          <a:bodyPr/>
+          <a:lstStyle/>
+          <a:p>
+            <a:fld id="{9CED725A-1658-4778-83A2-2C6F7BDEAE16}" type="slidenum">
+              <a:rPr lang="en-US" smtClean="0"/>
+              <a:t>9</a:t>
+            </a:fld>
+            <a:endParaRPr lang="en-US"/>
+          </a:p>
+        </p:txBody>
+      </p:sp>
+    </p:spTree>
+    <p:extLst>
+      <p:ext uri="{BB962C8B-B14F-4D97-AF65-F5344CB8AC3E}">
+        <p14:creationId xmlns:p14="http://schemas.microsoft.com/office/powerpoint/2010/main" val="1306334047"/>
+      </p:ext>
+    </p:extLst>
+  </p:cSld>
+  <p:clrMapOvr>
+    <a:masterClrMapping/>
+  </p:clrMapOvr>
+</p:notes>
 </file>
 
 <file path=ppt/slideLayouts/slideLayout1.xml><?xml version="1.0" encoding="utf-8"?>
@@ -249,7 +1709,7 @@
           <a:p>
             <a:fld id="{BAC9974E-F9A5-5C4F-8F16-8825B69A705C}" type="datetimeFigureOut">
               <a:rPr lang="en-US" smtClean="0"/>
-              <a:t>1/16/19</a:t>
+              <a:t>1/17/2019</a:t>
             </a:fld>
             <a:endParaRPr lang="en-US"/>
           </a:p>
@@ -414,7 +1874,7 @@
           <a:p>
             <a:fld id="{BAC9974E-F9A5-5C4F-8F16-8825B69A705C}" type="datetimeFigureOut">
               <a:rPr lang="en-US" smtClean="0"/>
-              <a:t>1/16/19</a:t>
+              <a:t>1/17/2019</a:t>
             </a:fld>
             <a:endParaRPr lang="en-US"/>
           </a:p>
@@ -589,7 +2049,7 @@
           <a:p>
             <a:fld id="{BAC9974E-F9A5-5C4F-8F16-8825B69A705C}" type="datetimeFigureOut">
               <a:rPr lang="en-US" smtClean="0"/>
-              <a:t>1/16/19</a:t>
+              <a:t>1/17/2019</a:t>
             </a:fld>
             <a:endParaRPr lang="en-US"/>
           </a:p>
@@ -754,7 +2214,7 @@
           <a:p>
             <a:fld id="{BAC9974E-F9A5-5C4F-8F16-8825B69A705C}" type="datetimeFigureOut">
               <a:rPr lang="en-US" smtClean="0"/>
-              <a:t>1/16/19</a:t>
+              <a:t>1/17/2019</a:t>
             </a:fld>
             <a:endParaRPr lang="en-US"/>
           </a:p>
@@ -993,7 +2453,7 @@
           <a:p>
             <a:fld id="{BAC9974E-F9A5-5C4F-8F16-8825B69A705C}" type="datetimeFigureOut">
               <a:rPr lang="en-US" smtClean="0"/>
-              <a:t>1/16/19</a:t>
+              <a:t>1/17/2019</a:t>
             </a:fld>
             <a:endParaRPr lang="en-US"/>
           </a:p>
@@ -1220,7 +2680,7 @@
           <a:p>
             <a:fld id="{BAC9974E-F9A5-5C4F-8F16-8825B69A705C}" type="datetimeFigureOut">
               <a:rPr lang="en-US" smtClean="0"/>
-              <a:t>1/16/19</a:t>
+              <a:t>1/17/2019</a:t>
             </a:fld>
             <a:endParaRPr lang="en-US"/>
           </a:p>
@@ -1582,7 +3042,7 @@
           <a:p>
             <a:fld id="{BAC9974E-F9A5-5C4F-8F16-8825B69A705C}" type="datetimeFigureOut">
               <a:rPr lang="en-US" smtClean="0"/>
-              <a:t>1/16/19</a:t>
+              <a:t>1/17/2019</a:t>
             </a:fld>
             <a:endParaRPr lang="en-US"/>
           </a:p>
@@ -1695,7 +3155,7 @@
           <a:p>
             <a:fld id="{BAC9974E-F9A5-5C4F-8F16-8825B69A705C}" type="datetimeFigureOut">
               <a:rPr lang="en-US" smtClean="0"/>
-              <a:t>1/16/19</a:t>
+              <a:t>1/17/2019</a:t>
             </a:fld>
             <a:endParaRPr lang="en-US"/>
           </a:p>
@@ -1785,7 +3245,7 @@
           <a:p>
             <a:fld id="{BAC9974E-F9A5-5C4F-8F16-8825B69A705C}" type="datetimeFigureOut">
               <a:rPr lang="en-US" smtClean="0"/>
-              <a:t>1/16/19</a:t>
+              <a:t>1/17/2019</a:t>
             </a:fld>
             <a:endParaRPr lang="en-US"/>
           </a:p>
@@ -2057,7 +3517,7 @@
           <a:p>
             <a:fld id="{BAC9974E-F9A5-5C4F-8F16-8825B69A705C}" type="datetimeFigureOut">
               <a:rPr lang="en-US" smtClean="0"/>
-              <a:t>1/16/19</a:t>
+              <a:t>1/17/2019</a:t>
             </a:fld>
             <a:endParaRPr lang="en-US"/>
           </a:p>
@@ -2309,7 +3769,7 @@
           <a:p>
             <a:fld id="{BAC9974E-F9A5-5C4F-8F16-8825B69A705C}" type="datetimeFigureOut">
               <a:rPr lang="en-US" smtClean="0"/>
-              <a:t>1/16/19</a:t>
+              <a:t>1/17/2019</a:t>
             </a:fld>
             <a:endParaRPr lang="en-US"/>
           </a:p>
@@ -2517,7 +3977,7 @@
           <a:p>
             <a:fld id="{BAC9974E-F9A5-5C4F-8F16-8825B69A705C}" type="datetimeFigureOut">
               <a:rPr lang="en-US" smtClean="0"/>
-              <a:t>1/16/19</a:t>
+              <a:t>1/17/2019</a:t>
             </a:fld>
             <a:endParaRPr lang="en-US"/>
           </a:p>
@@ -2998,6 +4458,586 @@
 </p:sld>
 </file>
 
+<file path=ppt/slides/slide10.xml><?xml version="1.0" encoding="utf-8"?>
+<p:sld xmlns:a="http://schemas.openxmlformats.org/drawingml/2006/main" xmlns:r="http://schemas.openxmlformats.org/officeDocument/2006/relationships" xmlns:p="http://schemas.openxmlformats.org/presentationml/2006/main">
+  <p:cSld>
+    <p:spTree>
+      <p:nvGrpSpPr>
+        <p:cNvPr id="1" name=""/>
+        <p:cNvGrpSpPr/>
+        <p:nvPr/>
+      </p:nvGrpSpPr>
+      <p:grpSpPr>
+        <a:xfrm>
+          <a:off x="0" y="0"/>
+          <a:ext cx="0" cy="0"/>
+          <a:chOff x="0" y="0"/>
+          <a:chExt cx="0" cy="0"/>
+        </a:xfrm>
+      </p:grpSpPr>
+      <p:sp>
+        <p:nvSpPr>
+          <p:cNvPr id="2" name="Title 1"/>
+          <p:cNvSpPr>
+            <a:spLocks noGrp="1"/>
+          </p:cNvSpPr>
+          <p:nvPr>
+            <p:ph type="title"/>
+          </p:nvPr>
+        </p:nvSpPr>
+        <p:spPr/>
+        <p:txBody>
+          <a:bodyPr/>
+          <a:lstStyle/>
+          <a:p>
+            <a:r>
+              <a:rPr lang="en-US" dirty="0"/>
+              <a:t>W3C Community Group</a:t>
+            </a:r>
+          </a:p>
+        </p:txBody>
+      </p:sp>
+      <p:sp>
+        <p:nvSpPr>
+          <p:cNvPr id="3" name="Content Placeholder 2"/>
+          <p:cNvSpPr>
+            <a:spLocks noGrp="1"/>
+          </p:cNvSpPr>
+          <p:nvPr>
+            <p:ph idx="1"/>
+          </p:nvPr>
+        </p:nvSpPr>
+        <p:spPr>
+          <a:xfrm>
+            <a:off x="628650" y="1690689"/>
+            <a:ext cx="8026977" cy="4351338"/>
+          </a:xfrm>
+        </p:spPr>
+        <p:txBody>
+          <a:bodyPr/>
+          <a:lstStyle/>
+          <a:p>
+            <a:r>
+              <a:rPr lang="en-US" dirty="0" smtClean="0"/>
+              <a:t>Keep and extend the current charter</a:t>
+            </a:r>
+          </a:p>
+          <a:p>
+            <a:r>
+              <a:rPr lang="en-US" dirty="0" smtClean="0"/>
+              <a:t>Provide a better venue for the group to operate</a:t>
+            </a:r>
+          </a:p>
+          <a:p>
+            <a:r>
+              <a:rPr lang="en-US" dirty="0" smtClean="0"/>
+              <a:t>Mailing list</a:t>
+            </a:r>
+          </a:p>
+          <a:p>
+            <a:r>
+              <a:rPr lang="en-US" dirty="0" smtClean="0"/>
+              <a:t>Work with related groups in W3C; Automotive, Spatial Data, Sensors, </a:t>
+            </a:r>
+            <a:r>
+              <a:rPr lang="en-US" dirty="0" err="1" smtClean="0"/>
+              <a:t>WoT</a:t>
+            </a:r>
+            <a:endParaRPr lang="en-US" dirty="0" smtClean="0"/>
+          </a:p>
+          <a:p>
+            <a:r>
+              <a:rPr lang="en-US" dirty="0" smtClean="0"/>
+              <a:t>Potential transition to higher status in W3C, e.g. "Evergreen standard"</a:t>
+            </a:r>
+          </a:p>
+          <a:p>
+            <a:r>
+              <a:rPr lang="en-US" dirty="0"/>
+              <a:t>https://www.w3.org/community/groups/proposed/</a:t>
+            </a:r>
+          </a:p>
+          <a:p>
+            <a:pPr lvl="1"/>
+            <a:r>
+              <a:rPr lang="en-US" dirty="0" smtClean="0"/>
+              <a:t>Schema Extensions for </a:t>
+            </a:r>
+            <a:r>
+              <a:rPr lang="en-US" dirty="0" err="1" smtClean="0"/>
+              <a:t>IoT</a:t>
+            </a:r>
+            <a:endParaRPr lang="en-US" dirty="0"/>
+          </a:p>
+        </p:txBody>
+      </p:sp>
+    </p:spTree>
+    <p:extLst>
+      <p:ext uri="{BB962C8B-B14F-4D97-AF65-F5344CB8AC3E}">
+        <p14:creationId xmlns:p14="http://schemas.microsoft.com/office/powerpoint/2010/main" val="340391922"/>
+      </p:ext>
+    </p:extLst>
+  </p:cSld>
+  <p:clrMapOvr>
+    <a:masterClrMapping/>
+  </p:clrMapOvr>
+</p:sld>
+</file>
+
+<file path=ppt/slides/slide11.xml><?xml version="1.0" encoding="utf-8"?>
+<p:sld xmlns:a="http://schemas.openxmlformats.org/drawingml/2006/main" xmlns:r="http://schemas.openxmlformats.org/officeDocument/2006/relationships" xmlns:p="http://schemas.openxmlformats.org/presentationml/2006/main">
+  <p:cSld>
+    <p:spTree>
+      <p:nvGrpSpPr>
+        <p:cNvPr id="1" name=""/>
+        <p:cNvGrpSpPr/>
+        <p:nvPr/>
+      </p:nvGrpSpPr>
+      <p:grpSpPr>
+        <a:xfrm>
+          <a:off x="0" y="0"/>
+          <a:ext cx="0" cy="0"/>
+          <a:chOff x="0" y="0"/>
+          <a:chExt cx="0" cy="0"/>
+        </a:xfrm>
+      </p:grpSpPr>
+      <p:sp>
+        <p:nvSpPr>
+          <p:cNvPr id="2" name="Title 1"/>
+          <p:cNvSpPr>
+            <a:spLocks noGrp="1"/>
+          </p:cNvSpPr>
+          <p:nvPr>
+            <p:ph type="title"/>
+          </p:nvPr>
+        </p:nvSpPr>
+        <p:spPr/>
+        <p:txBody>
+          <a:bodyPr/>
+          <a:lstStyle/>
+          <a:p>
+            <a:r>
+              <a:rPr lang="en-US" dirty="0" smtClean="0"/>
+              <a:t>2019 Roadmap </a:t>
+            </a:r>
+            <a:endParaRPr lang="en-US" dirty="0"/>
+          </a:p>
+        </p:txBody>
+      </p:sp>
+      <p:sp>
+        <p:nvSpPr>
+          <p:cNvPr id="3" name="Content Placeholder 2"/>
+          <p:cNvSpPr>
+            <a:spLocks noGrp="1"/>
+          </p:cNvSpPr>
+          <p:nvPr>
+            <p:ph idx="1"/>
+          </p:nvPr>
+        </p:nvSpPr>
+        <p:spPr/>
+        <p:txBody>
+          <a:bodyPr/>
+          <a:lstStyle/>
+          <a:p>
+            <a:r>
+              <a:rPr lang="en-US" dirty="0" smtClean="0"/>
+              <a:t>Start up the W3C Community Group</a:t>
+            </a:r>
+          </a:p>
+          <a:p>
+            <a:r>
+              <a:rPr lang="en-US" dirty="0" smtClean="0"/>
+              <a:t>Develop and document pattern, practices, and tools for creating and using definitions</a:t>
+            </a:r>
+          </a:p>
+          <a:p>
+            <a:r>
+              <a:rPr lang="en-US" dirty="0" smtClean="0"/>
+              <a:t>Web interface to browse definitions</a:t>
+            </a:r>
+          </a:p>
+          <a:p>
+            <a:r>
+              <a:rPr lang="en-US" dirty="0" err="1" smtClean="0"/>
+              <a:t>Schema.org</a:t>
+            </a:r>
+            <a:r>
+              <a:rPr lang="en-US" dirty="0" smtClean="0"/>
+              <a:t> integration</a:t>
+            </a:r>
+          </a:p>
+          <a:p>
+            <a:r>
+              <a:rPr lang="en-US" dirty="0" smtClean="0"/>
+              <a:t>Publish initial definition sets from contributors</a:t>
+            </a:r>
+          </a:p>
+          <a:p>
+            <a:r>
+              <a:rPr lang="en-US" dirty="0" smtClean="0"/>
+              <a:t>Identify future enhancements </a:t>
+            </a:r>
+          </a:p>
+          <a:p>
+            <a:pPr lvl="1"/>
+            <a:r>
+              <a:rPr lang="en-US" dirty="0" smtClean="0"/>
+              <a:t>semantic categories and classes</a:t>
+            </a:r>
+          </a:p>
+          <a:p>
+            <a:pPr lvl="1"/>
+            <a:r>
+              <a:rPr lang="en-US" dirty="0" smtClean="0"/>
+              <a:t>behaviors, rules, scenes</a:t>
+            </a:r>
+            <a:endParaRPr lang="en-US" dirty="0"/>
+          </a:p>
+        </p:txBody>
+      </p:sp>
+    </p:spTree>
+    <p:extLst>
+      <p:ext uri="{BB962C8B-B14F-4D97-AF65-F5344CB8AC3E}">
+        <p14:creationId xmlns:p14="http://schemas.microsoft.com/office/powerpoint/2010/main" val="2062572344"/>
+      </p:ext>
+    </p:extLst>
+  </p:cSld>
+  <p:clrMapOvr>
+    <a:masterClrMapping/>
+  </p:clrMapOvr>
+</p:sld>
+</file>
+
+<file path=ppt/slides/slide12.xml><?xml version="1.0" encoding="utf-8"?>
+<p:sld xmlns:a="http://schemas.openxmlformats.org/drawingml/2006/main" xmlns:r="http://schemas.openxmlformats.org/officeDocument/2006/relationships" xmlns:p="http://schemas.openxmlformats.org/presentationml/2006/main">
+  <p:cSld>
+    <p:spTree>
+      <p:nvGrpSpPr>
+        <p:cNvPr id="1" name=""/>
+        <p:cNvGrpSpPr/>
+        <p:nvPr/>
+      </p:nvGrpSpPr>
+      <p:grpSpPr>
+        <a:xfrm>
+          <a:off x="0" y="0"/>
+          <a:ext cx="0" cy="0"/>
+          <a:chOff x="0" y="0"/>
+          <a:chExt cx="0" cy="0"/>
+        </a:xfrm>
+      </p:grpSpPr>
+      <p:sp>
+        <p:nvSpPr>
+          <p:cNvPr id="2" name="Title 1"/>
+          <p:cNvSpPr>
+            <a:spLocks noGrp="1"/>
+          </p:cNvSpPr>
+          <p:nvPr>
+            <p:ph type="title"/>
+          </p:nvPr>
+        </p:nvSpPr>
+        <p:spPr/>
+        <p:txBody>
+          <a:bodyPr>
+            <a:normAutofit/>
+          </a:bodyPr>
+          <a:lstStyle/>
+          <a:p>
+            <a:r>
+              <a:rPr lang="en-US" dirty="0"/>
+              <a:t>Roadmap for </a:t>
+            </a:r>
+            <a:r>
+              <a:rPr lang="en-US" dirty="0" smtClean="0"/>
+              <a:t>2019</a:t>
+            </a:r>
+            <a:endParaRPr lang="en-US" dirty="0"/>
+          </a:p>
+        </p:txBody>
+      </p:sp>
+      <p:sp>
+        <p:nvSpPr>
+          <p:cNvPr id="3" name="Content Placeholder 2"/>
+          <p:cNvSpPr>
+            <a:spLocks noGrp="1"/>
+          </p:cNvSpPr>
+          <p:nvPr>
+            <p:ph idx="1"/>
+          </p:nvPr>
+        </p:nvSpPr>
+        <p:spPr/>
+        <p:txBody>
+          <a:bodyPr>
+            <a:normAutofit/>
+          </a:bodyPr>
+          <a:lstStyle/>
+          <a:p>
+            <a:r>
+              <a:rPr lang="en-US" dirty="0"/>
+              <a:t>Review the current iot.schema.org model</a:t>
+            </a:r>
+          </a:p>
+          <a:p>
+            <a:pPr lvl="1"/>
+            <a:r>
+              <a:rPr lang="en-US" dirty="0"/>
+              <a:t>Integration of schema.org-like model with RDF Data Shapes </a:t>
+            </a:r>
+          </a:p>
+          <a:p>
+            <a:pPr lvl="1"/>
+            <a:r>
+              <a:rPr lang="en-US" dirty="0"/>
+              <a:t>Support for extended scenarios based on querying, reasoning, and validation</a:t>
+            </a:r>
+          </a:p>
+          <a:p>
+            <a:r>
+              <a:rPr lang="en-US" dirty="0"/>
+              <a:t>Integration </a:t>
+            </a:r>
+            <a:r>
+              <a:rPr lang="en-US" dirty="0"/>
+              <a:t>of Project Haystack &amp; Brick with iot.schema.org</a:t>
+            </a:r>
+          </a:p>
+          <a:p>
+            <a:pPr lvl="1"/>
+            <a:r>
+              <a:rPr lang="en-US" dirty="0"/>
+              <a:t>Continuation of the work on model mappings</a:t>
+            </a:r>
+          </a:p>
+          <a:p>
+            <a:r>
+              <a:rPr lang="en-US" dirty="0"/>
+              <a:t>Extension of iot.schema.org for industrial domain</a:t>
+            </a:r>
+          </a:p>
+          <a:p>
+            <a:pPr lvl="1"/>
+            <a:r>
+              <a:rPr lang="en-US" dirty="0"/>
+              <a:t>Currently the focus is on smart home/building </a:t>
+            </a:r>
+          </a:p>
+        </p:txBody>
+      </p:sp>
+    </p:spTree>
+    <p:extLst>
+      <p:ext uri="{BB962C8B-B14F-4D97-AF65-F5344CB8AC3E}">
+        <p14:creationId xmlns:p14="http://schemas.microsoft.com/office/powerpoint/2010/main" val="1682043120"/>
+      </p:ext>
+    </p:extLst>
+  </p:cSld>
+  <p:clrMapOvr>
+    <a:masterClrMapping/>
+  </p:clrMapOvr>
+  <p:timing>
+    <p:tnLst>
+      <p:par>
+        <p:cTn id="1" dur="indefinite" restart="never" nodeType="tmRoot"/>
+      </p:par>
+    </p:tnLst>
+  </p:timing>
+</p:sld>
+</file>
+
+<file path=ppt/slides/slide13.xml><?xml version="1.0" encoding="utf-8"?>
+<p:sld xmlns:a="http://schemas.openxmlformats.org/drawingml/2006/main" xmlns:r="http://schemas.openxmlformats.org/officeDocument/2006/relationships" xmlns:p="http://schemas.openxmlformats.org/presentationml/2006/main">
+  <p:cSld>
+    <p:spTree>
+      <p:nvGrpSpPr>
+        <p:cNvPr id="1" name=""/>
+        <p:cNvGrpSpPr/>
+        <p:nvPr/>
+      </p:nvGrpSpPr>
+      <p:grpSpPr>
+        <a:xfrm>
+          <a:off x="0" y="0"/>
+          <a:ext cx="0" cy="0"/>
+          <a:chOff x="0" y="0"/>
+          <a:chExt cx="0" cy="0"/>
+        </a:xfrm>
+      </p:grpSpPr>
+      <p:sp>
+        <p:nvSpPr>
+          <p:cNvPr id="2" name="Title 1"/>
+          <p:cNvSpPr>
+            <a:spLocks noGrp="1"/>
+          </p:cNvSpPr>
+          <p:nvPr>
+            <p:ph type="title"/>
+          </p:nvPr>
+        </p:nvSpPr>
+        <p:spPr/>
+        <p:txBody>
+          <a:bodyPr>
+            <a:normAutofit/>
+          </a:bodyPr>
+          <a:lstStyle/>
+          <a:p>
+            <a:r>
+              <a:rPr lang="en-US" dirty="0"/>
+              <a:t>Roadmap for </a:t>
+            </a:r>
+            <a:r>
+              <a:rPr lang="en-US" dirty="0" smtClean="0"/>
+              <a:t>2019 Cont’d</a:t>
+            </a:r>
+            <a:endParaRPr lang="en-US" dirty="0"/>
+          </a:p>
+        </p:txBody>
+      </p:sp>
+      <p:sp>
+        <p:nvSpPr>
+          <p:cNvPr id="3" name="Content Placeholder 2"/>
+          <p:cNvSpPr>
+            <a:spLocks noGrp="1"/>
+          </p:cNvSpPr>
+          <p:nvPr>
+            <p:ph idx="1"/>
+          </p:nvPr>
+        </p:nvSpPr>
+        <p:spPr/>
+        <p:txBody>
+          <a:bodyPr>
+            <a:normAutofit/>
+          </a:bodyPr>
+          <a:lstStyle/>
+          <a:p>
+            <a:r>
+              <a:rPr lang="en-US" dirty="0"/>
+              <a:t>Extension </a:t>
+            </a:r>
+            <a:r>
+              <a:rPr lang="en-US" dirty="0"/>
+              <a:t>of iot.schema.org </a:t>
+            </a:r>
+            <a:r>
+              <a:rPr lang="en-US" dirty="0"/>
+              <a:t>with Feature of Interest (</a:t>
+            </a:r>
+            <a:r>
+              <a:rPr lang="en-US" dirty="0" err="1"/>
+              <a:t>FoI</a:t>
+            </a:r>
+            <a:r>
+              <a:rPr lang="en-US" dirty="0"/>
+              <a:t>)</a:t>
+            </a:r>
+          </a:p>
+          <a:p>
+            <a:pPr lvl="1"/>
+            <a:r>
+              <a:rPr lang="en-US" dirty="0"/>
+              <a:t>Continuation of the work </a:t>
+            </a:r>
+            <a:r>
+              <a:rPr lang="en-US" dirty="0"/>
+              <a:t>on </a:t>
+            </a:r>
+            <a:r>
+              <a:rPr lang="en-US" dirty="0" err="1"/>
+              <a:t>FoI</a:t>
+            </a:r>
+            <a:r>
+              <a:rPr lang="en-US" dirty="0"/>
+              <a:t> model </a:t>
+            </a:r>
+          </a:p>
+          <a:p>
+            <a:pPr lvl="1"/>
+            <a:r>
+              <a:rPr lang="en-US" dirty="0"/>
+              <a:t>Integration </a:t>
+            </a:r>
+            <a:r>
+              <a:rPr lang="en-US" dirty="0"/>
+              <a:t>of </a:t>
+            </a:r>
+            <a:r>
+              <a:rPr lang="en-US" dirty="0"/>
+              <a:t>existing </a:t>
+            </a:r>
+            <a:r>
+              <a:rPr lang="en-US" dirty="0" err="1"/>
+              <a:t>FoI</a:t>
+            </a:r>
+            <a:r>
+              <a:rPr lang="en-US" dirty="0"/>
+              <a:t> </a:t>
+            </a:r>
+            <a:r>
+              <a:rPr lang="en-US" dirty="0"/>
+              <a:t>with </a:t>
+            </a:r>
+            <a:r>
+              <a:rPr lang="en-US" dirty="0"/>
+              <a:t>iot.schema.org, e.g., W3C </a:t>
+            </a:r>
+            <a:r>
+              <a:rPr lang="en-US" dirty="0"/>
+              <a:t>Linked Building </a:t>
+            </a:r>
+            <a:r>
+              <a:rPr lang="en-US" dirty="0"/>
+              <a:t>Data</a:t>
+            </a:r>
+          </a:p>
+          <a:p>
+            <a:r>
+              <a:rPr lang="en-US" dirty="0"/>
+              <a:t>First proposal for Semantic API with iot.schema.org</a:t>
+            </a:r>
+          </a:p>
+          <a:p>
+            <a:r>
+              <a:rPr lang="en-US" dirty="0"/>
+              <a:t>Continuation of </a:t>
+            </a:r>
+            <a:r>
+              <a:rPr lang="en-US" dirty="0" err="1"/>
+              <a:t>iotschema</a:t>
+            </a:r>
+            <a:r>
+              <a:rPr lang="en-US" dirty="0"/>
+              <a:t>-node-red Project</a:t>
+            </a:r>
+            <a:endParaRPr lang="en-US" dirty="0"/>
+          </a:p>
+          <a:p>
+            <a:pPr lvl="1"/>
+            <a:r>
+              <a:rPr lang="en-US" dirty="0"/>
+              <a:t>Better integration of discovery, Semantic API… </a:t>
+            </a:r>
+          </a:p>
+          <a:p>
+            <a:pPr lvl="1"/>
+            <a:endParaRPr lang="en-US" sz="2400" dirty="0" smtClean="0"/>
+          </a:p>
+        </p:txBody>
+      </p:sp>
+    </p:spTree>
+    <p:extLst>
+      <p:ext uri="{BB962C8B-B14F-4D97-AF65-F5344CB8AC3E}">
+        <p14:creationId xmlns:p14="http://schemas.microsoft.com/office/powerpoint/2010/main" val="230841479"/>
+      </p:ext>
+    </p:extLst>
+  </p:cSld>
+  <p:clrMapOvr>
+    <a:masterClrMapping/>
+  </p:clrMapOvr>
+  <p:timing>
+    <p:tnLst>
+      <p:par>
+        <p:cTn id="1" dur="indefinite" restart="never" nodeType="tmRoot"/>
+      </p:par>
+    </p:tnLst>
+  </p:timing>
+</p:sld>
+</file>
+
 <file path=ppt/slides/slide2.xml><?xml version="1.0" encoding="utf-8"?>
 <p:sld xmlns:a="http://schemas.openxmlformats.org/drawingml/2006/main" xmlns:r="http://schemas.openxmlformats.org/officeDocument/2006/relationships" xmlns:p="http://schemas.openxmlformats.org/presentationml/2006/main">
   <p:cSld>
@@ -3114,11 +5154,7 @@
             <a:pPr lvl="1"/>
             <a:r>
               <a:rPr lang="en-US" dirty="0" smtClean="0"/>
-              <a:t>Roadmap </a:t>
-            </a:r>
-            <a:r>
-              <a:rPr lang="en-US" dirty="0" smtClean="0"/>
-              <a:t>for 2019</a:t>
+              <a:t>Roadmap for 2019</a:t>
             </a:r>
           </a:p>
           <a:p>
@@ -3169,7 +5205,7 @@
       </p:grpSpPr>
       <p:sp>
         <p:nvSpPr>
-          <p:cNvPr id="2" name="Title 1"/>
+          <p:cNvPr id="2" name="Titel 1"/>
           <p:cNvSpPr>
             <a:spLocks noGrp="1"/>
           </p:cNvSpPr>
@@ -3179,20 +5215,22 @@
         </p:nvSpPr>
         <p:spPr/>
         <p:txBody>
-          <a:bodyPr/>
-          <a:lstStyle/>
-          <a:p>
-            <a:r>
-              <a:rPr lang="en-US" dirty="0" smtClean="0"/>
-              <a:t>One Data Model Liaison Group</a:t>
-            </a:r>
-            <a:endParaRPr lang="en-US" dirty="0"/>
-          </a:p>
-        </p:txBody>
-      </p:sp>
-      <p:sp>
-        <p:nvSpPr>
-          <p:cNvPr id="3" name="Content Placeholder 2"/>
+          <a:bodyPr>
+            <a:normAutofit/>
+          </a:bodyPr>
+          <a:lstStyle/>
+          <a:p>
+            <a:r>
+              <a:rPr lang="en-US" dirty="0"/>
+              <a:t>iot.schema.org in Node-RED</a:t>
+            </a:r>
+            <a:endParaRPr lang="de-DE" dirty="0" smtClean="0"/>
+          </a:p>
+        </p:txBody>
+      </p:sp>
+      <p:sp>
+        <p:nvSpPr>
+          <p:cNvPr id="3" name="Inhaltsplatzhalter 2"/>
           <p:cNvSpPr>
             <a:spLocks noGrp="1"/>
           </p:cNvSpPr>
@@ -3202,68 +5240,66 @@
         </p:nvSpPr>
         <p:spPr/>
         <p:txBody>
-          <a:bodyPr/>
-          <a:lstStyle/>
-          <a:p>
-            <a:r>
-              <a:rPr lang="en-US" dirty="0" smtClean="0"/>
-              <a:t>Outgrowth of "Hive", a well-attended meeting sponsored by the </a:t>
-            </a:r>
-            <a:r>
-              <a:rPr lang="en-US" dirty="0" err="1" smtClean="0"/>
-              <a:t>Zigbee</a:t>
-            </a:r>
-            <a:r>
-              <a:rPr lang="en-US" dirty="0" smtClean="0"/>
-              <a:t> Alliance in November</a:t>
-            </a:r>
-          </a:p>
-          <a:p>
-            <a:r>
-              <a:rPr lang="en-US" dirty="0" smtClean="0"/>
-              <a:t>Address the device interoperability problem across SDOs, Vendors, Service Providers</a:t>
-            </a:r>
-          </a:p>
-          <a:p>
-            <a:r>
-              <a:rPr lang="en-US" dirty="0" smtClean="0"/>
-              <a:t>Open membership, equal participation by company</a:t>
-            </a:r>
-          </a:p>
-          <a:p>
-            <a:r>
-              <a:rPr lang="en-US" dirty="0" err="1" smtClean="0"/>
-              <a:t>Zigbee</a:t>
-            </a:r>
-            <a:r>
-              <a:rPr lang="en-US" dirty="0" smtClean="0"/>
-              <a:t>, OCF, OneM2M, GSMA, </a:t>
-            </a:r>
-            <a:r>
-              <a:rPr lang="en-US" dirty="0" err="1" smtClean="0"/>
-              <a:t>EnOcean</a:t>
-            </a:r>
-            <a:endParaRPr lang="en-US" dirty="0" smtClean="0"/>
-          </a:p>
-          <a:p>
-            <a:r>
-              <a:rPr lang="en-US" dirty="0" smtClean="0"/>
-              <a:t>Google, Comcast, Schneider Electric, Honeywell, Ericsson, Qualcomm, NXP, Orange, Cable Labs, Silicon Labs, Samsung, Huawei, Haier, many others</a:t>
-            </a:r>
-            <a:endParaRPr lang="en-US" dirty="0"/>
+          <a:bodyPr>
+            <a:normAutofit/>
+          </a:bodyPr>
+          <a:lstStyle/>
+          <a:p>
+            <a:r>
+              <a:rPr lang="en-US" sz="2800" dirty="0" smtClean="0"/>
+              <a:t>Is there an easy way for a Web application developer to use iot.schema.org?</a:t>
+            </a:r>
+          </a:p>
+          <a:p>
+            <a:r>
+              <a:rPr lang="en-US" sz="2800" dirty="0" smtClean="0"/>
+              <a:t>Our goal is to provide a tool that:</a:t>
+            </a:r>
+          </a:p>
+          <a:p>
+            <a:pPr lvl="1"/>
+            <a:r>
+              <a:rPr lang="en-US" sz="2400" dirty="0" smtClean="0"/>
+              <a:t>Does not require a developer to know RDF(S), JSON-LD, RDF Shapes etc. </a:t>
+            </a:r>
+          </a:p>
+          <a:p>
+            <a:pPr lvl="1"/>
+            <a:r>
+              <a:rPr lang="en-US" sz="2400" dirty="0" smtClean="0"/>
+              <a:t>Enables an easy configuration of things when using iot.schema.org </a:t>
+            </a:r>
+          </a:p>
+          <a:p>
+            <a:pPr lvl="1"/>
+            <a:r>
+              <a:rPr lang="en-US" sz="2400" dirty="0" smtClean="0"/>
+              <a:t>Avoids translations of serializations formats, data types, units etc.</a:t>
+            </a:r>
+            <a:endParaRPr lang="en-US" sz="2400" dirty="0"/>
+          </a:p>
+          <a:p>
+            <a:endParaRPr lang="de-DE" sz="2500" dirty="0" smtClean="0"/>
           </a:p>
         </p:txBody>
       </p:sp>
     </p:spTree>
     <p:extLst>
       <p:ext uri="{BB962C8B-B14F-4D97-AF65-F5344CB8AC3E}">
-        <p14:creationId xmlns:p14="http://schemas.microsoft.com/office/powerpoint/2010/main" val="1694788768"/>
+        <p14:creationId xmlns:p14="http://schemas.microsoft.com/office/powerpoint/2010/main" val="370494516"/>
       </p:ext>
     </p:extLst>
   </p:cSld>
   <p:clrMapOvr>
     <a:masterClrMapping/>
   </p:clrMapOvr>
+  <p:timing>
+    <p:tnLst>
+      <p:par>
+        <p:cTn id="1" dur="indefinite" restart="never" nodeType="tmRoot"/>
+      </p:par>
+    </p:tnLst>
+  </p:timing>
 </p:sld>
 </file>
 
@@ -3300,145 +5336,120 @@
           <a:lstStyle/>
           <a:p>
             <a:r>
-              <a:rPr lang="en-US" dirty="0"/>
-              <a:t>One Data Model Liaison Group</a:t>
-            </a:r>
-          </a:p>
-        </p:txBody>
-      </p:sp>
-      <p:sp>
-        <p:nvSpPr>
-          <p:cNvPr id="3" name="Content Placeholder 2"/>
-          <p:cNvSpPr>
-            <a:spLocks noGrp="1"/>
-          </p:cNvSpPr>
-          <p:nvPr>
-            <p:ph idx="1"/>
-          </p:nvPr>
-        </p:nvSpPr>
-        <p:spPr/>
-        <p:txBody>
-          <a:bodyPr/>
-          <a:lstStyle/>
-          <a:p>
-            <a:r>
-              <a:rPr lang="en-US" dirty="0" smtClean="0"/>
-              <a:t>Administratively hosted by OCF </a:t>
-            </a:r>
-          </a:p>
-          <a:p>
-            <a:r>
-              <a:rPr lang="en-US" dirty="0"/>
-              <a:t>Skip </a:t>
-            </a:r>
-            <a:r>
-              <a:rPr lang="en-US" dirty="0" smtClean="0"/>
-              <a:t>Ashton (SiLabs, </a:t>
-            </a:r>
-            <a:r>
-              <a:rPr lang="en-US" dirty="0" err="1" smtClean="0"/>
-              <a:t>Zigbee</a:t>
-            </a:r>
-            <a:r>
-              <a:rPr lang="en-US" dirty="0" smtClean="0"/>
-              <a:t>) </a:t>
-            </a:r>
-            <a:r>
-              <a:rPr lang="en-US" dirty="0"/>
-              <a:t>is Chair</a:t>
-            </a:r>
-          </a:p>
-          <a:p>
-            <a:r>
-              <a:rPr lang="en-US" dirty="0" smtClean="0"/>
-              <a:t>Weekly meetings; the third was January 16</a:t>
-            </a:r>
-            <a:r>
-              <a:rPr lang="en-US" baseline="30000" dirty="0" smtClean="0"/>
-              <a:t>th</a:t>
-            </a:r>
-            <a:r>
-              <a:rPr lang="en-US" dirty="0" smtClean="0"/>
-              <a:t> 2019</a:t>
-            </a:r>
-          </a:p>
-          <a:p>
-            <a:r>
-              <a:rPr lang="en-US" dirty="0" smtClean="0"/>
-              <a:t>Scope </a:t>
-            </a:r>
-            <a:r>
-              <a:rPr lang="en-US" dirty="0"/>
-              <a:t>and Priorities are being </a:t>
-            </a:r>
-            <a:r>
-              <a:rPr lang="en-US" dirty="0" smtClean="0"/>
-              <a:t>discussed</a:t>
-            </a:r>
-          </a:p>
-          <a:p>
-            <a:r>
-              <a:rPr lang="en-US" dirty="0" smtClean="0"/>
-              <a:t>Presentations are being given on existing models and approaches</a:t>
-            </a:r>
-          </a:p>
-          <a:p>
-            <a:pPr lvl="1"/>
-            <a:r>
-              <a:rPr lang="en-US" dirty="0" smtClean="0"/>
-              <a:t>January 4 </a:t>
-            </a:r>
-            <a:r>
-              <a:rPr lang="mr-IN" dirty="0" smtClean="0"/>
-              <a:t>–</a:t>
-            </a:r>
-            <a:r>
-              <a:rPr lang="en-US" dirty="0" smtClean="0"/>
-              <a:t> </a:t>
-            </a:r>
-            <a:r>
-              <a:rPr lang="en-US" dirty="0" err="1" smtClean="0"/>
-              <a:t>iot.schema.org</a:t>
-            </a:r>
-            <a:r>
-              <a:rPr lang="en-US" dirty="0" smtClean="0"/>
-              <a:t> </a:t>
-            </a:r>
-          </a:p>
-          <a:p>
-            <a:pPr lvl="1"/>
-            <a:r>
-              <a:rPr lang="en-US" dirty="0" smtClean="0"/>
-              <a:t>January 16 </a:t>
-            </a:r>
-            <a:r>
-              <a:rPr lang="mr-IN" dirty="0" smtClean="0"/>
-              <a:t>–</a:t>
-            </a:r>
-            <a:r>
-              <a:rPr lang="en-US" dirty="0" smtClean="0"/>
-              <a:t> Nest/Weave  </a:t>
-            </a:r>
-          </a:p>
-          <a:p>
-            <a:r>
-              <a:rPr lang="en-US" dirty="0" smtClean="0"/>
-              <a:t>Exploratory phase, gathering input and opinions</a:t>
+              <a:rPr lang="en-US" sz="4000" dirty="0">
+                <a:solidFill>
+                  <a:prstClr val="black"/>
+                </a:solidFill>
+                <a:latin typeface="Calibri Light" panose="020F0302020204030204"/>
+              </a:rPr>
+              <a:t>Example: Controlling </a:t>
+            </a:r>
+            <a:r>
+              <a:rPr lang="en-US" sz="4000" dirty="0" smtClean="0">
+                <a:solidFill>
+                  <a:prstClr val="black"/>
+                </a:solidFill>
+                <a:latin typeface="Calibri Light" panose="020F0302020204030204"/>
+              </a:rPr>
+              <a:t>Temperature   </a:t>
+            </a:r>
+            <a:r>
+              <a:rPr lang="en-US" sz="4000" dirty="0">
+                <a:solidFill>
+                  <a:prstClr val="black"/>
+                </a:solidFill>
+                <a:latin typeface="Calibri Light" panose="020F0302020204030204"/>
+              </a:rPr>
+              <a:t/>
+            </a:r>
+            <a:br>
+              <a:rPr lang="en-US" sz="4000" dirty="0">
+                <a:solidFill>
+                  <a:prstClr val="black"/>
+                </a:solidFill>
+                <a:latin typeface="Calibri Light" panose="020F0302020204030204"/>
+              </a:rPr>
+            </a:br>
+            <a:r>
+              <a:rPr lang="en-US" sz="2500" dirty="0">
+                <a:solidFill>
+                  <a:prstClr val="black"/>
+                </a:solidFill>
+                <a:latin typeface="Calibri Light" panose="020F0302020204030204"/>
+              </a:rPr>
+              <a:t>Node-RED Application with </a:t>
+            </a:r>
+            <a:r>
+              <a:rPr lang="en-US" sz="2500" dirty="0" smtClean="0">
+                <a:solidFill>
+                  <a:prstClr val="black"/>
+                </a:solidFill>
+                <a:latin typeface="Calibri Light" panose="020F0302020204030204"/>
+              </a:rPr>
+              <a:t>iot.schema.org Nodes</a:t>
             </a:r>
             <a:endParaRPr lang="en-US" dirty="0"/>
           </a:p>
         </p:txBody>
       </p:sp>
+      <p:pic>
+        <p:nvPicPr>
+          <p:cNvPr id="3074" name="Picture 2" descr="D:\UserData\z0037u6t\Work on Standardisation Activities\iot.schema.org\Repositories\iotschema-node-red\images\Temperature Control Recipe.PNG"/>
+          <p:cNvPicPr>
+            <a:picLocks noChangeAspect="1" noChangeArrowheads="1"/>
+          </p:cNvPicPr>
+          <p:nvPr/>
+        </p:nvPicPr>
+        <p:blipFill>
+          <a:blip r:embed="rId3">
+            <a:extLst>
+              <a:ext uri="{28A0092B-C50C-407E-A947-70E740481C1C}">
+                <a14:useLocalDpi xmlns:a14="http://schemas.microsoft.com/office/drawing/2010/main" val="0"/>
+              </a:ext>
+            </a:extLst>
+          </a:blip>
+          <a:srcRect/>
+          <a:stretch>
+            <a:fillRect/>
+          </a:stretch>
+        </p:blipFill>
+        <p:spPr bwMode="auto">
+          <a:xfrm>
+            <a:off x="467544" y="1700809"/>
+            <a:ext cx="8229600" cy="3770687"/>
+          </a:xfrm>
+          <a:prstGeom prst="rect">
+            <a:avLst/>
+          </a:prstGeom>
+          <a:noFill/>
+          <a:extLst>
+            <a:ext uri="{909E8E84-426E-40DD-AFC4-6F175D3DCCD1}">
+              <a14:hiddenFill xmlns:a14="http://schemas.microsoft.com/office/drawing/2010/main">
+                <a:solidFill>
+                  <a:srgbClr val="FFFFFF"/>
+                </a:solidFill>
+              </a14:hiddenFill>
+            </a:ext>
+          </a:extLst>
+        </p:spPr>
+      </p:pic>
     </p:spTree>
     <p:extLst>
       <p:ext uri="{BB962C8B-B14F-4D97-AF65-F5344CB8AC3E}">
-        <p14:creationId xmlns:p14="http://schemas.microsoft.com/office/powerpoint/2010/main" val="185914299"/>
+        <p14:creationId xmlns:p14="http://schemas.microsoft.com/office/powerpoint/2010/main" val="978755981"/>
       </p:ext>
     </p:extLst>
   </p:cSld>
   <p:clrMapOvr>
     <a:masterClrMapping/>
   </p:clrMapOvr>
+  <p:timing>
+    <p:tnLst>
+      <p:par>
+        <p:cTn id="1" dur="indefinite" restart="never" nodeType="tmRoot"/>
+      </p:par>
+    </p:tnLst>
+  </p:timing>
 </p:sld>
 </file>
 
@@ -3469,139 +5480,282 @@
             <p:ph type="title"/>
           </p:nvPr>
         </p:nvSpPr>
+        <p:spPr/>
+        <p:txBody>
+          <a:bodyPr>
+            <a:normAutofit/>
+          </a:bodyPr>
+          <a:lstStyle/>
+          <a:p>
+            <a:r>
+              <a:rPr lang="en-US" sz="4000" dirty="0">
+                <a:solidFill>
+                  <a:prstClr val="black"/>
+                </a:solidFill>
+                <a:latin typeface="Calibri Light" panose="020F0302020204030204"/>
+              </a:rPr>
+              <a:t>Integration of </a:t>
+            </a:r>
+            <a:r>
+              <a:rPr lang="en-US" sz="4000" dirty="0" err="1">
+                <a:solidFill>
+                  <a:prstClr val="black"/>
+                </a:solidFill>
+                <a:latin typeface="Calibri Light" panose="020F0302020204030204"/>
+              </a:rPr>
+              <a:t>WoT</a:t>
+            </a:r>
+            <a:r>
+              <a:rPr lang="en-US" sz="4000" dirty="0">
+                <a:solidFill>
+                  <a:prstClr val="black"/>
+                </a:solidFill>
+                <a:latin typeface="Calibri Light" panose="020F0302020204030204"/>
+              </a:rPr>
+              <a:t> Thing Directory </a:t>
+            </a:r>
+            <a:r>
+              <a:rPr lang="en-US" sz="4000" dirty="0" smtClean="0">
+                <a:solidFill>
+                  <a:prstClr val="black"/>
+                </a:solidFill>
+                <a:latin typeface="Calibri Light" panose="020F0302020204030204"/>
+              </a:rPr>
+              <a:t>in </a:t>
+            </a:r>
+            <a:r>
+              <a:rPr lang="en-US" sz="4000" dirty="0">
+                <a:solidFill>
+                  <a:prstClr val="black"/>
+                </a:solidFill>
+                <a:latin typeface="Calibri Light" panose="020F0302020204030204"/>
+              </a:rPr>
+              <a:t>the </a:t>
+            </a:r>
+            <a:r>
+              <a:rPr lang="en-US" sz="4000" dirty="0" err="1">
+                <a:solidFill>
+                  <a:prstClr val="black"/>
+                </a:solidFill>
+                <a:latin typeface="Calibri Light" panose="020F0302020204030204"/>
+              </a:rPr>
+              <a:t>iotschema</a:t>
+            </a:r>
+            <a:r>
+              <a:rPr lang="en-US" sz="4000" dirty="0">
+                <a:solidFill>
+                  <a:prstClr val="black"/>
+                </a:solidFill>
+                <a:latin typeface="Calibri Light" panose="020F0302020204030204"/>
+              </a:rPr>
+              <a:t>-node-red P</a:t>
+            </a:r>
+            <a:r>
+              <a:rPr lang="en-US" sz="4000" dirty="0" smtClean="0">
+                <a:solidFill>
+                  <a:prstClr val="black"/>
+                </a:solidFill>
+                <a:latin typeface="Calibri Light" panose="020F0302020204030204"/>
+              </a:rPr>
+              <a:t>roject</a:t>
+            </a:r>
+            <a:endParaRPr lang="en-US" dirty="0"/>
+          </a:p>
+        </p:txBody>
+      </p:sp>
+      <p:pic>
+        <p:nvPicPr>
+          <p:cNvPr id="4098" name="Picture 2"/>
+          <p:cNvPicPr>
+            <a:picLocks noChangeAspect="1" noChangeArrowheads="1"/>
+          </p:cNvPicPr>
+          <p:nvPr/>
+        </p:nvPicPr>
+        <p:blipFill rotWithShape="1">
+          <a:blip r:embed="rId3">
+            <a:extLst>
+              <a:ext uri="{28A0092B-C50C-407E-A947-70E740481C1C}">
+                <a14:useLocalDpi xmlns:a14="http://schemas.microsoft.com/office/drawing/2010/main" val="0"/>
+              </a:ext>
+            </a:extLst>
+          </a:blip>
+          <a:srcRect l="3485" t="2867"/>
+          <a:stretch/>
+        </p:blipFill>
+        <p:spPr bwMode="auto">
+          <a:xfrm>
+            <a:off x="467544" y="1700808"/>
+            <a:ext cx="8229600" cy="4119210"/>
+          </a:xfrm>
+          <a:prstGeom prst="rect">
+            <a:avLst/>
+          </a:prstGeom>
+          <a:noFill/>
+          <a:ln>
+            <a:noFill/>
+          </a:ln>
+          <a:effectLst/>
+          <a:extLst>
+            <a:ext uri="{909E8E84-426E-40DD-AFC4-6F175D3DCCD1}">
+              <a14:hiddenFill xmlns:a14="http://schemas.microsoft.com/office/drawing/2010/main">
+                <a:solidFill>
+                  <a:schemeClr val="accent1"/>
+                </a:solidFill>
+              </a14:hiddenFill>
+            </a:ext>
+            <a:ext uri="{91240B29-F687-4F45-9708-019B960494DF}">
+              <a14:hiddenLine xmlns:a14="http://schemas.microsoft.com/office/drawing/2010/main" w="9525">
+                <a:solidFill>
+                  <a:schemeClr val="tx1"/>
+                </a:solidFill>
+                <a:miter lim="800000"/>
+                <a:headEnd/>
+                <a:tailEnd/>
+              </a14:hiddenLine>
+            </a:ext>
+            <a:ext uri="{AF507438-7753-43E0-B8FC-AC1667EBCBE1}">
+              <a14:hiddenEffects xmlns:a14="http://schemas.microsoft.com/office/drawing/2010/main">
+                <a:effectLst>
+                  <a:outerShdw dist="35921" dir="2700000" algn="ctr" rotWithShape="0">
+                    <a:schemeClr val="bg2"/>
+                  </a:outerShdw>
+                </a:effectLst>
+              </a14:hiddenEffects>
+            </a:ext>
+          </a:extLst>
+        </p:spPr>
+      </p:pic>
+      <p:sp>
+        <p:nvSpPr>
+          <p:cNvPr id="3" name="Rectangle 2"/>
+          <p:cNvSpPr/>
+          <p:nvPr/>
+        </p:nvSpPr>
         <p:spPr>
           <a:xfrm>
-            <a:off x="628650" y="271608"/>
-            <a:ext cx="7886700" cy="1325563"/>
+            <a:off x="7287616" y="2204864"/>
+            <a:ext cx="1388840" cy="3456384"/>
           </a:xfrm>
+          <a:prstGeom prst="rect">
+            <a:avLst/>
+          </a:prstGeom>
+          <a:solidFill>
+            <a:schemeClr val="lt1">
+              <a:alpha val="0"/>
+            </a:schemeClr>
+          </a:solidFill>
         </p:spPr>
-        <p:txBody>
-          <a:bodyPr/>
-          <a:lstStyle/>
-          <a:p>
-            <a:r>
-              <a:rPr lang="en-US" dirty="0" smtClean="0"/>
-              <a:t>W3C Community Group</a:t>
-            </a:r>
-            <a:endParaRPr lang="en-US" dirty="0"/>
-          </a:p>
-        </p:txBody>
-      </p:sp>
-      <p:sp>
-        <p:nvSpPr>
-          <p:cNvPr id="3" name="Content Placeholder 2"/>
-          <p:cNvSpPr>
-            <a:spLocks noGrp="1"/>
-          </p:cNvSpPr>
-          <p:nvPr>
-            <p:ph idx="1"/>
-          </p:nvPr>
-        </p:nvSpPr>
-        <p:spPr>
-          <a:xfrm>
-            <a:off x="628650" y="1763425"/>
-            <a:ext cx="8151668" cy="4351338"/>
-          </a:xfrm>
-        </p:spPr>
-        <p:txBody>
-          <a:bodyPr/>
-          <a:lstStyle/>
-          <a:p>
-            <a:r>
-              <a:rPr lang="en-US" dirty="0" smtClean="0"/>
-              <a:t>We have proposed a new W3C CG for </a:t>
-            </a:r>
-            <a:r>
-              <a:rPr lang="en-US" dirty="0" err="1" smtClean="0"/>
-              <a:t>IoT</a:t>
-            </a:r>
-            <a:r>
-              <a:rPr lang="en-US" dirty="0" smtClean="0"/>
-              <a:t> Extensions to </a:t>
-            </a:r>
-            <a:r>
-              <a:rPr lang="en-US" dirty="0" err="1" smtClean="0"/>
-              <a:t>schema.org</a:t>
-            </a:r>
-            <a:endParaRPr lang="en-US" dirty="0" smtClean="0"/>
-          </a:p>
-          <a:p>
-            <a:pPr lvl="1"/>
-            <a:r>
-              <a:rPr lang="en-US" dirty="0"/>
-              <a:t>https://www.w3.org/community/blog/2019/01/17/proposed-group-schema-extensions-for-</a:t>
-            </a:r>
-            <a:r>
-              <a:rPr lang="en-US" dirty="0" err="1"/>
-              <a:t>iot</a:t>
-            </a:r>
-            <a:r>
-              <a:rPr lang="en-US" dirty="0"/>
-              <a:t>-community-group/</a:t>
-            </a:r>
-            <a:endParaRPr lang="en-US" dirty="0" smtClean="0"/>
-          </a:p>
-          <a:p>
-            <a:r>
-              <a:rPr lang="en-US" dirty="0" smtClean="0"/>
-              <a:t>The charter will be our current charter (see the </a:t>
-            </a:r>
-            <a:r>
-              <a:rPr lang="en-US" dirty="0" err="1" smtClean="0"/>
-              <a:t>github</a:t>
-            </a:r>
-            <a:r>
-              <a:rPr lang="en-US" dirty="0" smtClean="0"/>
-              <a:t> repository)</a:t>
-            </a:r>
-          </a:p>
-          <a:p>
-            <a:r>
-              <a:rPr lang="en-US" dirty="0" smtClean="0"/>
-              <a:t>Four additional </a:t>
-            </a:r>
-            <a:r>
-              <a:rPr lang="en-US" dirty="0" smtClean="0"/>
-              <a:t>supporting members are required to start the group</a:t>
-            </a:r>
-          </a:p>
-          <a:p>
-            <a:r>
-              <a:rPr lang="en-US" dirty="0" smtClean="0"/>
-              <a:t>https</a:t>
-            </a:r>
-            <a:r>
-              <a:rPr lang="en-US" dirty="0"/>
-              <a:t>://www.w3.org/community/groups/proposed/</a:t>
-            </a:r>
-          </a:p>
-          <a:p>
-            <a:pPr lvl="1"/>
-            <a:r>
-              <a:rPr lang="en-US" dirty="0"/>
-              <a:t>Schema Extensions for </a:t>
-            </a:r>
-            <a:r>
-              <a:rPr lang="en-US" dirty="0" err="1"/>
-              <a:t>IoT</a:t>
-            </a:r>
-            <a:endParaRPr lang="en-US" dirty="0"/>
-          </a:p>
-          <a:p>
-            <a:endParaRPr lang="en-US" dirty="0" smtClean="0"/>
+        <p:style>
+          <a:lnRef idx="2">
+            <a:schemeClr val="accent2"/>
+          </a:lnRef>
+          <a:fillRef idx="1">
+            <a:schemeClr val="lt1"/>
+          </a:fillRef>
+          <a:effectRef idx="0">
+            <a:schemeClr val="accent2"/>
+          </a:effectRef>
+          <a:fontRef idx="minor">
+            <a:schemeClr val="dk1"/>
+          </a:fontRef>
+        </p:style>
+        <p:txBody>
+          <a:bodyPr rtlCol="0" anchor="ctr"/>
+          <a:lstStyle/>
+          <a:p>
+            <a:pPr algn="ctr"/>
+            <a:endParaRPr lang="en-US"/>
           </a:p>
         </p:txBody>
       </p:sp>
     </p:spTree>
     <p:extLst>
       <p:ext uri="{BB962C8B-B14F-4D97-AF65-F5344CB8AC3E}">
-        <p14:creationId xmlns:p14="http://schemas.microsoft.com/office/powerpoint/2010/main" val="1275538431"/>
+        <p14:creationId xmlns:p14="http://schemas.microsoft.com/office/powerpoint/2010/main" val="3649721728"/>
       </p:ext>
     </p:extLst>
   </p:cSld>
   <p:clrMapOvr>
     <a:masterClrMapping/>
   </p:clrMapOvr>
+  <p:timing>
+    <p:tnLst>
+      <p:par>
+        <p:cTn id="1" dur="indefinite" restart="never" nodeType="tmRoot">
+          <p:childTnLst>
+            <p:seq concurrent="1" nextAc="seek">
+              <p:cTn id="2" dur="indefinite" nodeType="mainSeq">
+                <p:childTnLst>
+                  <p:par>
+                    <p:cTn id="3" fill="hold">
+                      <p:stCondLst>
+                        <p:cond delay="indefinite"/>
+                      </p:stCondLst>
+                      <p:childTnLst>
+                        <p:par>
+                          <p:cTn id="4" fill="hold">
+                            <p:stCondLst>
+                              <p:cond delay="0"/>
+                            </p:stCondLst>
+                            <p:childTnLst>
+                              <p:par>
+                                <p:cTn id="5" presetID="1" presetClass="entr" presetSubtype="0" fill="hold" grpId="0" nodeType="clickEffect">
+                                  <p:stCondLst>
+                                    <p:cond delay="0"/>
+                                  </p:stCondLst>
+                                  <p:childTnLst>
+                                    <p:set>
+                                      <p:cBhvr>
+                                        <p:cTn id="6" dur="1" fill="hold">
+                                          <p:stCondLst>
+                                            <p:cond delay="0"/>
+                                          </p:stCondLst>
+                                        </p:cTn>
+                                        <p:tgtEl>
+                                          <p:spTgt spid="3"/>
+                                        </p:tgtEl>
+                                        <p:attrNameLst>
+                                          <p:attrName>style.visibility</p:attrName>
+                                        </p:attrNameLst>
+                                      </p:cBhvr>
+                                      <p:to>
+                                        <p:strVal val="visible"/>
+                                      </p:to>
+                                    </p:set>
+                                  </p:childTnLst>
+                                </p:cTn>
+                              </p:par>
+                            </p:childTnLst>
+                          </p:cTn>
+                        </p:par>
+                      </p:childTnLst>
+                    </p:cTn>
+                  </p:par>
+                </p:childTnLst>
+              </p:cTn>
+              <p:prevCondLst>
+                <p:cond evt="onPrev" delay="0">
+                  <p:tgtEl>
+                    <p:sldTgt/>
+                  </p:tgtEl>
+                </p:cond>
+              </p:prevCondLst>
+              <p:nextCondLst>
+                <p:cond evt="onNext" delay="0">
+                  <p:tgtEl>
+                    <p:sldTgt/>
+                  </p:tgtEl>
+                </p:cond>
+              </p:nextCondLst>
+            </p:seq>
+          </p:childTnLst>
+        </p:cTn>
+      </p:par>
+    </p:tnLst>
+    <p:bldLst>
+      <p:bldP spid="3" grpId="0" animBg="1"/>
+    </p:bldLst>
+  </p:timing>
 </p:sld>
 </file>
 
@@ -3634,100 +5788,166 @@
         </p:nvSpPr>
         <p:spPr/>
         <p:txBody>
-          <a:bodyPr/>
-          <a:lstStyle/>
-          <a:p>
-            <a:r>
-              <a:rPr lang="en-US" dirty="0"/>
-              <a:t>W3C Community Group</a:t>
-            </a:r>
-          </a:p>
-        </p:txBody>
-      </p:sp>
-      <p:sp>
-        <p:nvSpPr>
-          <p:cNvPr id="3" name="Content Placeholder 2"/>
-          <p:cNvSpPr>
-            <a:spLocks noGrp="1"/>
-          </p:cNvSpPr>
-          <p:nvPr>
-            <p:ph idx="1"/>
-          </p:nvPr>
-        </p:nvSpPr>
-        <p:spPr>
+          <a:bodyPr>
+            <a:normAutofit/>
+          </a:bodyPr>
+          <a:lstStyle/>
+          <a:p>
+            <a:r>
+              <a:rPr lang="en-US" sz="4000" dirty="0">
+                <a:solidFill>
+                  <a:prstClr val="black"/>
+                </a:solidFill>
+                <a:latin typeface="Calibri Light" panose="020F0302020204030204"/>
+              </a:rPr>
+              <a:t>Integration of </a:t>
+            </a:r>
+            <a:r>
+              <a:rPr lang="en-US" sz="4000" dirty="0" err="1">
+                <a:solidFill>
+                  <a:prstClr val="black"/>
+                </a:solidFill>
+                <a:latin typeface="Calibri Light" panose="020F0302020204030204"/>
+              </a:rPr>
+              <a:t>WoT</a:t>
+            </a:r>
+            <a:r>
+              <a:rPr lang="en-US" sz="4000" dirty="0">
+                <a:solidFill>
+                  <a:prstClr val="black"/>
+                </a:solidFill>
+                <a:latin typeface="Calibri Light" panose="020F0302020204030204"/>
+              </a:rPr>
+              <a:t> Thing Directory </a:t>
+            </a:r>
+            <a:r>
+              <a:rPr lang="en-US" sz="4000" dirty="0" smtClean="0">
+                <a:solidFill>
+                  <a:prstClr val="black"/>
+                </a:solidFill>
+                <a:latin typeface="Calibri Light" panose="020F0302020204030204"/>
+              </a:rPr>
+              <a:t>in </a:t>
+            </a:r>
+            <a:r>
+              <a:rPr lang="en-US" sz="4000" dirty="0">
+                <a:solidFill>
+                  <a:prstClr val="black"/>
+                </a:solidFill>
+                <a:latin typeface="Calibri Light" panose="020F0302020204030204"/>
+              </a:rPr>
+              <a:t>the </a:t>
+            </a:r>
+            <a:r>
+              <a:rPr lang="en-US" sz="4000" dirty="0" err="1">
+                <a:solidFill>
+                  <a:prstClr val="black"/>
+                </a:solidFill>
+                <a:latin typeface="Calibri Light" panose="020F0302020204030204"/>
+              </a:rPr>
+              <a:t>iotschema</a:t>
+            </a:r>
+            <a:r>
+              <a:rPr lang="en-US" sz="4000" dirty="0">
+                <a:solidFill>
+                  <a:prstClr val="black"/>
+                </a:solidFill>
+                <a:latin typeface="Calibri Light" panose="020F0302020204030204"/>
+              </a:rPr>
+              <a:t>-node-red P</a:t>
+            </a:r>
+            <a:r>
+              <a:rPr lang="en-US" sz="4000" dirty="0" smtClean="0">
+                <a:solidFill>
+                  <a:prstClr val="black"/>
+                </a:solidFill>
+                <a:latin typeface="Calibri Light" panose="020F0302020204030204"/>
+              </a:rPr>
+              <a:t>roject</a:t>
+            </a:r>
+            <a:endParaRPr lang="en-US" dirty="0"/>
+          </a:p>
+        </p:txBody>
+      </p:sp>
+      <p:pic>
+        <p:nvPicPr>
+          <p:cNvPr id="5122" name="Picture 2"/>
+          <p:cNvPicPr>
+            <a:picLocks noChangeAspect="1" noChangeArrowheads="1"/>
+          </p:cNvPicPr>
+          <p:nvPr/>
+        </p:nvPicPr>
+        <p:blipFill rotWithShape="1">
+          <a:blip r:embed="rId3">
+            <a:extLst>
+              <a:ext uri="{28A0092B-C50C-407E-A947-70E740481C1C}">
+                <a14:useLocalDpi xmlns:a14="http://schemas.microsoft.com/office/drawing/2010/main" val="0"/>
+              </a:ext>
+            </a:extLst>
+          </a:blip>
+          <a:srcRect l="83286" t="14543" b="35593"/>
+          <a:stretch/>
+        </p:blipFill>
+        <p:spPr bwMode="auto">
           <a:xfrm>
-            <a:off x="628650" y="1690689"/>
-            <a:ext cx="8026977" cy="4351338"/>
+            <a:off x="5259795" y="1634299"/>
+            <a:ext cx="3056621" cy="4531005"/>
           </a:xfrm>
+          <a:prstGeom prst="rect">
+            <a:avLst/>
+          </a:prstGeom>
+          <a:noFill/>
+          <a:ln>
+            <a:noFill/>
+          </a:ln>
+          <a:effectLst/>
+          <a:extLst>
+            <a:ext uri="{909E8E84-426E-40DD-AFC4-6F175D3DCCD1}">
+              <a14:hiddenFill xmlns:a14="http://schemas.microsoft.com/office/drawing/2010/main">
+                <a:solidFill>
+                  <a:schemeClr val="accent1"/>
+                </a:solidFill>
+              </a14:hiddenFill>
+            </a:ext>
+            <a:ext uri="{91240B29-F687-4F45-9708-019B960494DF}">
+              <a14:hiddenLine xmlns:a14="http://schemas.microsoft.com/office/drawing/2010/main" w="9525">
+                <a:solidFill>
+                  <a:schemeClr val="tx1"/>
+                </a:solidFill>
+                <a:miter lim="800000"/>
+                <a:headEnd/>
+                <a:tailEnd/>
+              </a14:hiddenLine>
+            </a:ext>
+            <a:ext uri="{AF507438-7753-43E0-B8FC-AC1667EBCBE1}">
+              <a14:hiddenEffects xmlns:a14="http://schemas.microsoft.com/office/drawing/2010/main">
+                <a:effectLst>
+                  <a:outerShdw dist="35921" dir="2700000" algn="ctr" rotWithShape="0">
+                    <a:schemeClr val="bg2"/>
+                  </a:outerShdw>
+                </a:effectLst>
+              </a14:hiddenEffects>
+            </a:ext>
+          </a:extLst>
         </p:spPr>
-        <p:txBody>
-          <a:bodyPr/>
-          <a:lstStyle/>
-          <a:p>
-            <a:r>
-              <a:rPr lang="en-US" dirty="0" smtClean="0"/>
-              <a:t>Keep and extend the current charter</a:t>
-            </a:r>
-          </a:p>
-          <a:p>
-            <a:r>
-              <a:rPr lang="en-US" dirty="0" smtClean="0"/>
-              <a:t>Provide a better venue for the group to operate</a:t>
-            </a:r>
-          </a:p>
-          <a:p>
-            <a:r>
-              <a:rPr lang="en-US" dirty="0" smtClean="0"/>
-              <a:t>Mailing list</a:t>
-            </a:r>
-          </a:p>
-          <a:p>
-            <a:r>
-              <a:rPr lang="en-US" dirty="0" smtClean="0"/>
-              <a:t>Work with related groups in W3C; Automotive, Spatial Data, Sensors, </a:t>
-            </a:r>
-            <a:r>
-              <a:rPr lang="en-US" dirty="0" err="1" smtClean="0"/>
-              <a:t>WoT</a:t>
-            </a:r>
-            <a:endParaRPr lang="en-US" dirty="0" smtClean="0"/>
-          </a:p>
-          <a:p>
-            <a:r>
-              <a:rPr lang="en-US" dirty="0" smtClean="0"/>
-              <a:t>Potential transition to higher status in W3C, e.g. "Evergreen standard"</a:t>
-            </a:r>
-          </a:p>
-          <a:p>
-            <a:r>
-              <a:rPr lang="en-US" dirty="0"/>
-              <a:t>https://www.w3.org/community/groups/proposed/</a:t>
-            </a:r>
-          </a:p>
-          <a:p>
-            <a:pPr lvl="1"/>
-            <a:r>
-              <a:rPr lang="en-US" dirty="0" smtClean="0"/>
-              <a:t>Schema Extensions for </a:t>
-            </a:r>
-            <a:r>
-              <a:rPr lang="en-US" dirty="0" err="1" smtClean="0"/>
-              <a:t>IoT</a:t>
-            </a:r>
-            <a:endParaRPr lang="en-US" dirty="0"/>
-          </a:p>
-        </p:txBody>
-      </p:sp>
+      </p:pic>
     </p:spTree>
     <p:extLst>
       <p:ext uri="{BB962C8B-B14F-4D97-AF65-F5344CB8AC3E}">
-        <p14:creationId xmlns:p14="http://schemas.microsoft.com/office/powerpoint/2010/main" val="340391922"/>
+        <p14:creationId xmlns:p14="http://schemas.microsoft.com/office/powerpoint/2010/main" val="4219862242"/>
       </p:ext>
     </p:extLst>
   </p:cSld>
   <p:clrMapOvr>
     <a:masterClrMapping/>
   </p:clrMapOvr>
+  <p:timing>
+    <p:tnLst>
+      <p:par>
+        <p:cTn id="1" dur="indefinite" restart="never" nodeType="tmRoot"/>
+      </p:par>
+    </p:tnLst>
+  </p:timing>
 </p:sld>
 </file>
 
@@ -3765,7 +5985,7 @@
           <a:p>
             <a:r>
               <a:rPr lang="en-US" dirty="0" smtClean="0"/>
-              <a:t>2019 Roadmap </a:t>
+              <a:t>One Data Model Liaison Group</a:t>
             </a:r>
             <a:endParaRPr lang="en-US" dirty="0"/>
           </a:p>
@@ -3788,55 +6008,48 @@
           <a:p>
             <a:r>
               <a:rPr lang="en-US" dirty="0" smtClean="0"/>
-              <a:t>Start up the W3C Community Group</a:t>
-            </a:r>
-          </a:p>
-          <a:p>
+              <a:t>Outgrowth of "Hive", a well-attended meeting sponsored by the </a:t>
+            </a:r>
+            <a:r>
+              <a:rPr lang="en-US" dirty="0" err="1" smtClean="0"/>
+              <a:t>Zigbee</a:t>
+            </a:r>
             <a:r>
               <a:rPr lang="en-US" dirty="0" smtClean="0"/>
-              <a:t>Develop and document pattern, practices, and tools for creating and using definitions</a:t>
+              <a:t> Alliance in November</a:t>
             </a:r>
           </a:p>
           <a:p>
             <a:r>
               <a:rPr lang="en-US" dirty="0" smtClean="0"/>
-              <a:t>Web interface to browse definitions</a:t>
+              <a:t>Address the device interoperability problem across SDOs, Vendors, Service Providers</a:t>
+            </a:r>
+          </a:p>
+          <a:p>
+            <a:r>
+              <a:rPr lang="en-US" dirty="0" smtClean="0"/>
+              <a:t>Open membership, equal participation by company</a:t>
             </a:r>
           </a:p>
           <a:p>
             <a:r>
               <a:rPr lang="en-US" dirty="0" err="1" smtClean="0"/>
-              <a:t>Schema.org</a:t>
+              <a:t>Zigbee</a:t>
             </a:r>
             <a:r>
               <a:rPr lang="en-US" dirty="0" smtClean="0"/>
-              <a:t> integration</a:t>
-            </a:r>
+              <a:t>, OCF, OneM2M, GSMA, </a:t>
+            </a:r>
+            <a:r>
+              <a:rPr lang="en-US" dirty="0" err="1" smtClean="0"/>
+              <a:t>EnOcean</a:t>
+            </a:r>
+            <a:endParaRPr lang="en-US" dirty="0" smtClean="0"/>
           </a:p>
           <a:p>
             <a:r>
               <a:rPr lang="en-US" dirty="0" smtClean="0"/>
-              <a:t>Publish initial definition sets from contributors</a:t>
-            </a:r>
-          </a:p>
-          <a:p>
-            <a:r>
-              <a:rPr lang="en-US" dirty="0" smtClean="0"/>
-              <a:t>Identify future enhancements </a:t>
-            </a:r>
-          </a:p>
-          <a:p>
-            <a:pPr lvl="1"/>
-            <a:r>
-              <a:rPr lang="en-US" dirty="0" smtClean="0"/>
-              <a:t>semantic categories and classes</a:t>
-            </a:r>
-          </a:p>
-          <a:p>
-            <a:pPr lvl="1"/>
-            <a:r>
-              <a:rPr lang="en-US" dirty="0" smtClean="0"/>
-              <a:t>behaviors, rules, scenes</a:t>
+              <a:t>Google, Comcast, Schneider Electric, Honeywell, Ericsson, Qualcomm, NXP, Orange, Cable Labs, Silicon Labs, Samsung, Huawei, Haier, many others</a:t>
             </a:r>
             <a:endParaRPr lang="en-US" dirty="0"/>
           </a:p>
@@ -3845,7 +6058,341 @@
     </p:spTree>
     <p:extLst>
       <p:ext uri="{BB962C8B-B14F-4D97-AF65-F5344CB8AC3E}">
-        <p14:creationId xmlns:p14="http://schemas.microsoft.com/office/powerpoint/2010/main" val="2062572344"/>
+        <p14:creationId xmlns:p14="http://schemas.microsoft.com/office/powerpoint/2010/main" val="1694788768"/>
+      </p:ext>
+    </p:extLst>
+  </p:cSld>
+  <p:clrMapOvr>
+    <a:masterClrMapping/>
+  </p:clrMapOvr>
+</p:sld>
+</file>
+
+<file path=ppt/slides/slide8.xml><?xml version="1.0" encoding="utf-8"?>
+<p:sld xmlns:a="http://schemas.openxmlformats.org/drawingml/2006/main" xmlns:r="http://schemas.openxmlformats.org/officeDocument/2006/relationships" xmlns:p="http://schemas.openxmlformats.org/presentationml/2006/main">
+  <p:cSld>
+    <p:spTree>
+      <p:nvGrpSpPr>
+        <p:cNvPr id="1" name=""/>
+        <p:cNvGrpSpPr/>
+        <p:nvPr/>
+      </p:nvGrpSpPr>
+      <p:grpSpPr>
+        <a:xfrm>
+          <a:off x="0" y="0"/>
+          <a:ext cx="0" cy="0"/>
+          <a:chOff x="0" y="0"/>
+          <a:chExt cx="0" cy="0"/>
+        </a:xfrm>
+      </p:grpSpPr>
+      <p:sp>
+        <p:nvSpPr>
+          <p:cNvPr id="2" name="Title 1"/>
+          <p:cNvSpPr>
+            <a:spLocks noGrp="1"/>
+          </p:cNvSpPr>
+          <p:nvPr>
+            <p:ph type="title"/>
+          </p:nvPr>
+        </p:nvSpPr>
+        <p:spPr/>
+        <p:txBody>
+          <a:bodyPr/>
+          <a:lstStyle/>
+          <a:p>
+            <a:r>
+              <a:rPr lang="en-US" dirty="0"/>
+              <a:t>One Data Model Liaison Group</a:t>
+            </a:r>
+          </a:p>
+        </p:txBody>
+      </p:sp>
+      <p:sp>
+        <p:nvSpPr>
+          <p:cNvPr id="3" name="Content Placeholder 2"/>
+          <p:cNvSpPr>
+            <a:spLocks noGrp="1"/>
+          </p:cNvSpPr>
+          <p:nvPr>
+            <p:ph idx="1"/>
+          </p:nvPr>
+        </p:nvSpPr>
+        <p:spPr/>
+        <p:txBody>
+          <a:bodyPr/>
+          <a:lstStyle/>
+          <a:p>
+            <a:r>
+              <a:rPr lang="en-US" dirty="0" smtClean="0"/>
+              <a:t>Administratively hosted by OCF </a:t>
+            </a:r>
+          </a:p>
+          <a:p>
+            <a:r>
+              <a:rPr lang="en-US" dirty="0"/>
+              <a:t>Skip </a:t>
+            </a:r>
+            <a:r>
+              <a:rPr lang="en-US" dirty="0" smtClean="0"/>
+              <a:t>Ashton (SiLabs, </a:t>
+            </a:r>
+            <a:r>
+              <a:rPr lang="en-US" dirty="0" err="1" smtClean="0"/>
+              <a:t>Zigbee</a:t>
+            </a:r>
+            <a:r>
+              <a:rPr lang="en-US" dirty="0" smtClean="0"/>
+              <a:t>) </a:t>
+            </a:r>
+            <a:r>
+              <a:rPr lang="en-US" dirty="0"/>
+              <a:t>is Chair</a:t>
+            </a:r>
+          </a:p>
+          <a:p>
+            <a:r>
+              <a:rPr lang="en-US" dirty="0" smtClean="0"/>
+              <a:t>Weekly meetings; the third was January 16</a:t>
+            </a:r>
+            <a:r>
+              <a:rPr lang="en-US" baseline="30000" dirty="0" smtClean="0"/>
+              <a:t>th</a:t>
+            </a:r>
+            <a:r>
+              <a:rPr lang="en-US" dirty="0" smtClean="0"/>
+              <a:t> 2019</a:t>
+            </a:r>
+          </a:p>
+          <a:p>
+            <a:r>
+              <a:rPr lang="en-US" dirty="0" smtClean="0"/>
+              <a:t>Scope </a:t>
+            </a:r>
+            <a:r>
+              <a:rPr lang="en-US" dirty="0"/>
+              <a:t>and Priorities are being </a:t>
+            </a:r>
+            <a:r>
+              <a:rPr lang="en-US" dirty="0" smtClean="0"/>
+              <a:t>discussed</a:t>
+            </a:r>
+          </a:p>
+          <a:p>
+            <a:r>
+              <a:rPr lang="en-US" dirty="0" smtClean="0"/>
+              <a:t>Presentations are being given on existing models and approaches</a:t>
+            </a:r>
+          </a:p>
+          <a:p>
+            <a:pPr lvl="1"/>
+            <a:r>
+              <a:rPr lang="en-US" dirty="0" smtClean="0"/>
+              <a:t>January 4 </a:t>
+            </a:r>
+            <a:r>
+              <a:rPr lang="mr-IN" dirty="0" smtClean="0"/>
+              <a:t>–</a:t>
+            </a:r>
+            <a:r>
+              <a:rPr lang="en-US" dirty="0" smtClean="0"/>
+              <a:t> </a:t>
+            </a:r>
+            <a:r>
+              <a:rPr lang="en-US" dirty="0" err="1" smtClean="0"/>
+              <a:t>iot.schema.org</a:t>
+            </a:r>
+            <a:r>
+              <a:rPr lang="en-US" dirty="0" smtClean="0"/>
+              <a:t> </a:t>
+            </a:r>
+          </a:p>
+          <a:p>
+            <a:pPr lvl="1"/>
+            <a:r>
+              <a:rPr lang="en-US" dirty="0" smtClean="0"/>
+              <a:t>January 16 </a:t>
+            </a:r>
+            <a:r>
+              <a:rPr lang="mr-IN" dirty="0" smtClean="0"/>
+              <a:t>–</a:t>
+            </a:r>
+            <a:r>
+              <a:rPr lang="en-US" dirty="0" smtClean="0"/>
+              <a:t> Nest/Weave  </a:t>
+            </a:r>
+          </a:p>
+          <a:p>
+            <a:r>
+              <a:rPr lang="en-US" dirty="0" smtClean="0"/>
+              <a:t>Exploratory phase, gathering input and opinions</a:t>
+            </a:r>
+            <a:endParaRPr lang="en-US" dirty="0"/>
+          </a:p>
+        </p:txBody>
+      </p:sp>
+    </p:spTree>
+    <p:extLst>
+      <p:ext uri="{BB962C8B-B14F-4D97-AF65-F5344CB8AC3E}">
+        <p14:creationId xmlns:p14="http://schemas.microsoft.com/office/powerpoint/2010/main" val="185914299"/>
+      </p:ext>
+    </p:extLst>
+  </p:cSld>
+  <p:clrMapOvr>
+    <a:masterClrMapping/>
+  </p:clrMapOvr>
+</p:sld>
+</file>
+
+<file path=ppt/slides/slide9.xml><?xml version="1.0" encoding="utf-8"?>
+<p:sld xmlns:a="http://schemas.openxmlformats.org/drawingml/2006/main" xmlns:r="http://schemas.openxmlformats.org/officeDocument/2006/relationships" xmlns:p="http://schemas.openxmlformats.org/presentationml/2006/main">
+  <p:cSld>
+    <p:spTree>
+      <p:nvGrpSpPr>
+        <p:cNvPr id="1" name=""/>
+        <p:cNvGrpSpPr/>
+        <p:nvPr/>
+      </p:nvGrpSpPr>
+      <p:grpSpPr>
+        <a:xfrm>
+          <a:off x="0" y="0"/>
+          <a:ext cx="0" cy="0"/>
+          <a:chOff x="0" y="0"/>
+          <a:chExt cx="0" cy="0"/>
+        </a:xfrm>
+      </p:grpSpPr>
+      <p:sp>
+        <p:nvSpPr>
+          <p:cNvPr id="2" name="Title 1"/>
+          <p:cNvSpPr>
+            <a:spLocks noGrp="1"/>
+          </p:cNvSpPr>
+          <p:nvPr>
+            <p:ph type="title"/>
+          </p:nvPr>
+        </p:nvSpPr>
+        <p:spPr>
+          <a:xfrm>
+            <a:off x="628650" y="271608"/>
+            <a:ext cx="7886700" cy="1325563"/>
+          </a:xfrm>
+        </p:spPr>
+        <p:txBody>
+          <a:bodyPr/>
+          <a:lstStyle/>
+          <a:p>
+            <a:r>
+              <a:rPr lang="en-US" dirty="0" smtClean="0"/>
+              <a:t>W3C Community Group</a:t>
+            </a:r>
+            <a:endParaRPr lang="en-US" dirty="0"/>
+          </a:p>
+        </p:txBody>
+      </p:sp>
+      <p:sp>
+        <p:nvSpPr>
+          <p:cNvPr id="3" name="Content Placeholder 2"/>
+          <p:cNvSpPr>
+            <a:spLocks noGrp="1"/>
+          </p:cNvSpPr>
+          <p:nvPr>
+            <p:ph idx="1"/>
+          </p:nvPr>
+        </p:nvSpPr>
+        <p:spPr>
+          <a:xfrm>
+            <a:off x="628650" y="1763425"/>
+            <a:ext cx="8151668" cy="4351338"/>
+          </a:xfrm>
+        </p:spPr>
+        <p:txBody>
+          <a:bodyPr/>
+          <a:lstStyle/>
+          <a:p>
+            <a:r>
+              <a:rPr lang="en-US" dirty="0" smtClean="0"/>
+              <a:t>We have proposed a new W3C CG for </a:t>
+            </a:r>
+            <a:r>
+              <a:rPr lang="en-US" dirty="0" err="1" smtClean="0"/>
+              <a:t>IoT</a:t>
+            </a:r>
+            <a:r>
+              <a:rPr lang="en-US" dirty="0" smtClean="0"/>
+              <a:t> Extensions to </a:t>
+            </a:r>
+            <a:r>
+              <a:rPr lang="en-US" dirty="0" err="1" smtClean="0"/>
+              <a:t>schema.org</a:t>
+            </a:r>
+            <a:endParaRPr lang="en-US" dirty="0" smtClean="0"/>
+          </a:p>
+          <a:p>
+            <a:pPr lvl="1"/>
+            <a:r>
+              <a:rPr lang="en-US" dirty="0"/>
+              <a:t>https://www.w3.org/community/blog/2019/01/17/proposed-group-schema-extensions-for-</a:t>
+            </a:r>
+            <a:r>
+              <a:rPr lang="en-US" dirty="0" err="1"/>
+              <a:t>iot</a:t>
+            </a:r>
+            <a:r>
+              <a:rPr lang="en-US" dirty="0"/>
+              <a:t>-community-group/</a:t>
+            </a:r>
+            <a:endParaRPr lang="en-US" dirty="0" smtClean="0"/>
+          </a:p>
+          <a:p>
+            <a:r>
+              <a:rPr lang="en-US" dirty="0" smtClean="0"/>
+              <a:t>The charter will be our current charter (see the </a:t>
+            </a:r>
+            <a:r>
+              <a:rPr lang="en-US" dirty="0" err="1" smtClean="0"/>
+              <a:t>github</a:t>
+            </a:r>
+            <a:r>
+              <a:rPr lang="en-US" dirty="0" smtClean="0"/>
+              <a:t> repository)</a:t>
+            </a:r>
+          </a:p>
+          <a:p>
+            <a:r>
+              <a:rPr lang="en-US" dirty="0" smtClean="0"/>
+              <a:t>Four additional supporting members are required to start the group</a:t>
+            </a:r>
+          </a:p>
+          <a:p>
+            <a:r>
+              <a:rPr lang="en-US" dirty="0" smtClean="0"/>
+              <a:t>https</a:t>
+            </a:r>
+            <a:r>
+              <a:rPr lang="en-US" dirty="0"/>
+              <a:t>://www.w3.org/community/groups/proposed/</a:t>
+            </a:r>
+          </a:p>
+          <a:p>
+            <a:pPr lvl="1"/>
+            <a:r>
+              <a:rPr lang="en-US" dirty="0"/>
+              <a:t>Schema Extensions for </a:t>
+            </a:r>
+            <a:r>
+              <a:rPr lang="en-US" dirty="0" err="1"/>
+              <a:t>IoT</a:t>
+            </a:r>
+            <a:endParaRPr lang="en-US" dirty="0"/>
+          </a:p>
+          <a:p>
+            <a:endParaRPr lang="en-US" dirty="0" smtClean="0"/>
+          </a:p>
+        </p:txBody>
+      </p:sp>
+    </p:spTree>
+    <p:extLst>
+      <p:ext uri="{BB962C8B-B14F-4D97-AF65-F5344CB8AC3E}">
+        <p14:creationId xmlns:p14="http://schemas.microsoft.com/office/powerpoint/2010/main" val="1275538431"/>
       </p:ext>
     </p:extLst>
   </p:cSld>
@@ -4110,8 +6657,363 @@
   <a:extraClrSchemeLst/>
   <a:extLst>
     <a:ext uri="{05A4C25C-085E-4340-85A3-A5531E510DB2}">
-      <thm15:themeFamily xmlns:thm15="http://schemas.microsoft.com/office/thememl/2012/main" name="Office Theme" id="{62F939B6-93AF-4DB8-9C6B-D6C7DFDC589F}" vid="{4A3C46E8-61CC-4603-A589-7422A47A8E4A}"/>
+      <thm15:themeFamily xmlns:thm15="http://schemas.microsoft.com/office/thememl/2012/main" xmlns="" name="Office Theme" id="{62F939B6-93AF-4DB8-9C6B-D6C7DFDC589F}" vid="{4A3C46E8-61CC-4603-A589-7422A47A8E4A}"/>
     </a:ext>
   </a:extLst>
 </a:theme>
+</file>
+
+<file path=ppt/theme/theme2.xml><?xml version="1.0" encoding="utf-8"?>
+<a:theme xmlns:a="http://schemas.openxmlformats.org/drawingml/2006/main" name="Office Theme">
+  <a:themeElements>
+    <a:clrScheme name="Office">
+      <a:dk1>
+        <a:sysClr val="windowText" lastClr="000000"/>
+      </a:dk1>
+      <a:lt1>
+        <a:sysClr val="window" lastClr="FFFFFF"/>
+      </a:lt1>
+      <a:dk2>
+        <a:srgbClr val="1F497D"/>
+      </a:dk2>
+      <a:lt2>
+        <a:srgbClr val="EEECE1"/>
+      </a:lt2>
+      <a:accent1>
+        <a:srgbClr val="4F81BD"/>
+      </a:accent1>
+      <a:accent2>
+        <a:srgbClr val="C0504D"/>
+      </a:accent2>
+      <a:accent3>
+        <a:srgbClr val="9BBB59"/>
+      </a:accent3>
+      <a:accent4>
+        <a:srgbClr val="8064A2"/>
+      </a:accent4>
+      <a:accent5>
+        <a:srgbClr val="4BACC6"/>
+      </a:accent5>
+      <a:accent6>
+        <a:srgbClr val="F79646"/>
+      </a:accent6>
+      <a:hlink>
+        <a:srgbClr val="0000FF"/>
+      </a:hlink>
+      <a:folHlink>
+        <a:srgbClr val="800080"/>
+      </a:folHlink>
+    </a:clrScheme>
+    <a:fontScheme name="Office">
+      <a:majorFont>
+        <a:latin typeface="Calibri"/>
+        <a:ea typeface=""/>
+        <a:cs typeface=""/>
+        <a:font script="Jpan" typeface="ＭＳ Ｐゴシック"/>
+        <a:font script="Hang" typeface="맑은 고딕"/>
+        <a:font script="Hans" typeface="宋体"/>
+        <a:font script="Hant" typeface="新細明體"/>
+        <a:font script="Arab" typeface="Times New Roman"/>
+        <a:font script="Hebr" typeface="Times New Roman"/>
+        <a:font script="Thai" typeface="Angsana New"/>
+        <a:font script="Ethi" typeface="Nyala"/>
+        <a:font script="Beng" typeface="Vrinda"/>
+        <a:font script="Gujr" typeface="Shruti"/>
+        <a:font script="Khmr" typeface="MoolBoran"/>
+        <a:font script="Knda" typeface="Tunga"/>
+        <a:font script="Guru" typeface="Raavi"/>
+        <a:font script="Cans" typeface="Euphemia"/>
+        <a:font script="Cher" typeface="Plantagenet Cherokee"/>
+        <a:font script="Yiii" typeface="Microsoft Yi Baiti"/>
+        <a:font script="Tibt" typeface="Microsoft Himalaya"/>
+        <a:font script="Thaa" typeface="MV Boli"/>
+        <a:font script="Deva" typeface="Mangal"/>
+        <a:font script="Telu" typeface="Gautami"/>
+        <a:font script="Taml" typeface="Latha"/>
+        <a:font script="Syrc" typeface="Estrangelo Edessa"/>
+        <a:font script="Orya" typeface="Kalinga"/>
+        <a:font script="Mlym" typeface="Kartika"/>
+        <a:font script="Laoo" typeface="DokChampa"/>
+        <a:font script="Sinh" typeface="Iskoola Pota"/>
+        <a:font script="Mong" typeface="Mongolian Baiti"/>
+        <a:font script="Viet" typeface="Times New Roman"/>
+        <a:font script="Uigh" typeface="Microsoft Uighur"/>
+        <a:font script="Geor" typeface="Sylfaen"/>
+      </a:majorFont>
+      <a:minorFont>
+        <a:latin typeface="Calibri"/>
+        <a:ea typeface=""/>
+        <a:cs typeface=""/>
+        <a:font script="Jpan" typeface="ＭＳ Ｐゴシック"/>
+        <a:font script="Hang" typeface="맑은 고딕"/>
+        <a:font script="Hans" typeface="宋体"/>
+        <a:font script="Hant" typeface="新細明體"/>
+        <a:font script="Arab" typeface="Arial"/>
+        <a:font script="Hebr" typeface="Arial"/>
+        <a:font script="Thai" typeface="Cordia New"/>
+        <a:font script="Ethi" typeface="Nyala"/>
+        <a:font script="Beng" typeface="Vrinda"/>
+        <a:font script="Gujr" typeface="Shruti"/>
+        <a:font script="Khmr" typeface="DaunPenh"/>
+        <a:font script="Knda" typeface="Tunga"/>
+        <a:font script="Guru" typeface="Raavi"/>
+        <a:font script="Cans" typeface="Euphemia"/>
+        <a:font script="Cher" typeface="Plantagenet Cherokee"/>
+        <a:font script="Yiii" typeface="Microsoft Yi Baiti"/>
+        <a:font script="Tibt" typeface="Microsoft Himalaya"/>
+        <a:font script="Thaa" typeface="MV Boli"/>
+        <a:font script="Deva" typeface="Mangal"/>
+        <a:font script="Telu" typeface="Gautami"/>
+        <a:font script="Taml" typeface="Latha"/>
+        <a:font script="Syrc" typeface="Estrangelo Edessa"/>
+        <a:font script="Orya" typeface="Kalinga"/>
+        <a:font script="Mlym" typeface="Kartika"/>
+        <a:font script="Laoo" typeface="DokChampa"/>
+        <a:font script="Sinh" typeface="Iskoola Pota"/>
+        <a:font script="Mong" typeface="Mongolian Baiti"/>
+        <a:font script="Viet" typeface="Arial"/>
+        <a:font script="Uigh" typeface="Microsoft Uighur"/>
+        <a:font script="Geor" typeface="Sylfaen"/>
+      </a:minorFont>
+    </a:fontScheme>
+    <a:fmtScheme name="Office">
+      <a:fillStyleLst>
+        <a:solidFill>
+          <a:schemeClr val="phClr"/>
+        </a:solidFill>
+        <a:gradFill rotWithShape="1">
+          <a:gsLst>
+            <a:gs pos="0">
+              <a:schemeClr val="phClr">
+                <a:tint val="50000"/>
+                <a:satMod val="300000"/>
+              </a:schemeClr>
+            </a:gs>
+            <a:gs pos="35000">
+              <a:schemeClr val="phClr">
+                <a:tint val="37000"/>
+                <a:satMod val="300000"/>
+              </a:schemeClr>
+            </a:gs>
+            <a:gs pos="100000">
+              <a:schemeClr val="phClr">
+                <a:tint val="15000"/>
+                <a:satMod val="350000"/>
+              </a:schemeClr>
+            </a:gs>
+          </a:gsLst>
+          <a:lin ang="16200000" scaled="1"/>
+        </a:gradFill>
+        <a:gradFill rotWithShape="1">
+          <a:gsLst>
+            <a:gs pos="0">
+              <a:schemeClr val="phClr">
+                <a:shade val="51000"/>
+                <a:satMod val="130000"/>
+              </a:schemeClr>
+            </a:gs>
+            <a:gs pos="80000">
+              <a:schemeClr val="phClr">
+                <a:shade val="93000"/>
+                <a:satMod val="130000"/>
+              </a:schemeClr>
+            </a:gs>
+            <a:gs pos="100000">
+              <a:schemeClr val="phClr">
+                <a:shade val="94000"/>
+                <a:satMod val="135000"/>
+              </a:schemeClr>
+            </a:gs>
+          </a:gsLst>
+          <a:lin ang="16200000" scaled="0"/>
+        </a:gradFill>
+      </a:fillStyleLst>
+      <a:lnStyleLst>
+        <a:ln w="9525" cap="flat" cmpd="sng" algn="ctr">
+          <a:solidFill>
+            <a:schemeClr val="phClr">
+              <a:shade val="95000"/>
+              <a:satMod val="105000"/>
+            </a:schemeClr>
+          </a:solidFill>
+          <a:prstDash val="solid"/>
+        </a:ln>
+        <a:ln w="25400" cap="flat" cmpd="sng" algn="ctr">
+          <a:solidFill>
+            <a:schemeClr val="phClr"/>
+          </a:solidFill>
+          <a:prstDash val="solid"/>
+        </a:ln>
+        <a:ln w="38100" cap="flat" cmpd="sng" algn="ctr">
+          <a:solidFill>
+            <a:schemeClr val="phClr"/>
+          </a:solidFill>
+          <a:prstDash val="solid"/>
+        </a:ln>
+      </a:lnStyleLst>
+      <a:effectStyleLst>
+        <a:effectStyle>
+          <a:effectLst>
+            <a:outerShdw blurRad="40000" dist="20000" dir="5400000" rotWithShape="0">
+              <a:srgbClr val="000000">
+                <a:alpha val="38000"/>
+              </a:srgbClr>
+            </a:outerShdw>
+          </a:effectLst>
+        </a:effectStyle>
+        <a:effectStyle>
+          <a:effectLst>
+            <a:outerShdw blurRad="40000" dist="23000" dir="5400000" rotWithShape="0">
+              <a:srgbClr val="000000">
+                <a:alpha val="35000"/>
+              </a:srgbClr>
+            </a:outerShdw>
+          </a:effectLst>
+        </a:effectStyle>
+        <a:effectStyle>
+          <a:effectLst>
+            <a:outerShdw blurRad="40000" dist="23000" dir="5400000" rotWithShape="0">
+              <a:srgbClr val="000000">
+                <a:alpha val="35000"/>
+              </a:srgbClr>
+            </a:outerShdw>
+          </a:effectLst>
+          <a:scene3d>
+            <a:camera prst="orthographicFront">
+              <a:rot lat="0" lon="0" rev="0"/>
+            </a:camera>
+            <a:lightRig rig="threePt" dir="t">
+              <a:rot lat="0" lon="0" rev="1200000"/>
+            </a:lightRig>
+          </a:scene3d>
+          <a:sp3d>
+            <a:bevelT w="63500" h="25400"/>
+          </a:sp3d>
+        </a:effectStyle>
+      </a:effectStyleLst>
+      <a:bgFillStyleLst>
+        <a:solidFill>
+          <a:schemeClr val="phClr"/>
+        </a:solidFill>
+        <a:gradFill rotWithShape="1">
+          <a:gsLst>
+            <a:gs pos="0">
+              <a:schemeClr val="phClr">
+                <a:tint val="40000"/>
+                <a:satMod val="350000"/>
+              </a:schemeClr>
+            </a:gs>
+            <a:gs pos="40000">
+              <a:schemeClr val="phClr">
+                <a:tint val="45000"/>
+                <a:shade val="99000"/>
+                <a:satMod val="350000"/>
+              </a:schemeClr>
+            </a:gs>
+            <a:gs pos="100000">
+              <a:schemeClr val="phClr">
+                <a:shade val="20000"/>
+                <a:satMod val="255000"/>
+              </a:schemeClr>
+            </a:gs>
+          </a:gsLst>
+          <a:path path="circle">
+            <a:fillToRect l="50000" t="-80000" r="50000" b="180000"/>
+          </a:path>
+        </a:gradFill>
+        <a:gradFill rotWithShape="1">
+          <a:gsLst>
+            <a:gs pos="0">
+              <a:schemeClr val="phClr">
+                <a:tint val="80000"/>
+                <a:satMod val="300000"/>
+              </a:schemeClr>
+            </a:gs>
+            <a:gs pos="100000">
+              <a:schemeClr val="phClr">
+                <a:shade val="30000"/>
+                <a:satMod val="200000"/>
+              </a:schemeClr>
+            </a:gs>
+          </a:gsLst>
+          <a:path path="circle">
+            <a:fillToRect l="50000" t="50000" r="50000" b="50000"/>
+          </a:path>
+        </a:gradFill>
+      </a:bgFillStyleLst>
+    </a:fmtScheme>
+  </a:themeElements>
+  <a:objectDefaults/>
+  <a:extraClrSchemeLst/>
+</a:theme>
+</file>
+
+<file path=customXml/item1.xml><?xml version="1.0" encoding="utf-8"?>
+<VariableListDefinition name="AD_HOC" displayName="AD_HOC" id="0455b5fc-a0b2-44a0-808d-692a564eaf58" isdomainofvalue="False" dataSourceId="c230f891-e486-41a2-8755-11eb5fce7ca6"/>
+</file>
+
+<file path=customXml/item2.xml><?xml version="1.0" encoding="utf-8"?>
+<VariableList UniqueId="0455b5fc-a0b2-44a0-808d-692a564eaf58" Name="AD_HOC" ContentType="XML" MajorVersion="0" MinorVersion="1" isLocalCopy="False" IsBaseObject="False" DataSourceId="c230f891-e486-41a2-8755-11eb5fce7ca6" DataSourceMajorVersion="0" DataSourceMinorVersion="1"/>
+</file>
+
+<file path=customXml/item3.xml><?xml version="1.0" encoding="utf-8"?>
+<VariableListDefinition name="Computed" displayName="Computed" id="d2956b4a-7c78-49cb-88a7-89034081e11e" isdomainofvalue="False" dataSourceId="0bebb841-c08a-47f5-974f-0827eab22ad5"/>
+</file>
+
+<file path=customXml/item4.xml><?xml version="1.0" encoding="utf-8"?>
+<VariableList UniqueId="d2956b4a-7c78-49cb-88a7-89034081e11e" Name="Computed" ContentType="XML" MajorVersion="0" MinorVersion="1" isLocalCopy="False" IsBaseObject="False" DataSourceId="0bebb841-c08a-47f5-974f-0827eab22ad5" DataSourceMajorVersion="0" DataSourceMinorVersion="1"/>
+</file>
+
+<file path=customXml/item5.xml><?xml version="1.0" encoding="utf-8"?>
+<VariableListDefinition name="System" displayName="System" id="5b432be9-f97e-4925-a220-378bef06bf86" isdomainofvalue="False" dataSourceId="37ed5a23-c0e8-467d-8def-afe3d74d7b75"/>
+</file>
+
+<file path=customXml/item6.xml><?xml version="1.0" encoding="utf-8"?>
+<VariableList UniqueId="5b432be9-f97e-4925-a220-378bef06bf86" Name="System" ContentType="XML" MajorVersion="0" MinorVersion="1" isLocalCopy="False" IsBaseObject="False" DataSourceId="37ed5a23-c0e8-467d-8def-afe3d74d7b75" DataSourceMajorVersion="0" DataSourceMinorVersion="1"/>
+</file>
+
+<file path=customXml/item7.xml><?xml version="1.0" encoding="utf-8"?>
+<AllExternalAdhocVariableMappings/>
+</file>
+
+<file path=customXml/itemProps1.xml><?xml version="1.0" encoding="utf-8"?>
+<ds:datastoreItem xmlns:ds="http://schemas.openxmlformats.org/officeDocument/2006/customXml" ds:itemID="{4A783DAB-774C-457C-9347-21C15D616853}">
+  <ds:schemaRefs/>
+</ds:datastoreItem>
+</file>
+
+<file path=customXml/itemProps2.xml><?xml version="1.0" encoding="utf-8"?>
+<ds:datastoreItem xmlns:ds="http://schemas.openxmlformats.org/officeDocument/2006/customXml" ds:itemID="{D332788D-64EF-4001-95FC-ADAD36C348FB}">
+  <ds:schemaRefs/>
+</ds:datastoreItem>
+</file>
+
+<file path=customXml/itemProps3.xml><?xml version="1.0" encoding="utf-8"?>
+<ds:datastoreItem xmlns:ds="http://schemas.openxmlformats.org/officeDocument/2006/customXml" ds:itemID="{53770F1B-E004-4C8F-81B0-16A9157D5787}">
+  <ds:schemaRefs/>
+</ds:datastoreItem>
+</file>
+
+<file path=customXml/itemProps4.xml><?xml version="1.0" encoding="utf-8"?>
+<ds:datastoreItem xmlns:ds="http://schemas.openxmlformats.org/officeDocument/2006/customXml" ds:itemID="{36007DB4-68ED-4783-9685-F253A101E60B}">
+  <ds:schemaRefs/>
+</ds:datastoreItem>
+</file>
+
+<file path=customXml/itemProps5.xml><?xml version="1.0" encoding="utf-8"?>
+<ds:datastoreItem xmlns:ds="http://schemas.openxmlformats.org/officeDocument/2006/customXml" ds:itemID="{D111120A-E8F4-4551-824F-EE2547619FB7}">
+  <ds:schemaRefs/>
+</ds:datastoreItem>
+</file>
+
+<file path=customXml/itemProps6.xml><?xml version="1.0" encoding="utf-8"?>
+<ds:datastoreItem xmlns:ds="http://schemas.openxmlformats.org/officeDocument/2006/customXml" ds:itemID="{454978B7-78CA-4AF5-B623-4FEA8D06A714}">
+  <ds:schemaRefs/>
+</ds:datastoreItem>
+</file>
+
+<file path=customXml/itemProps7.xml><?xml version="1.0" encoding="utf-8"?>
+<ds:datastoreItem xmlns:ds="http://schemas.openxmlformats.org/officeDocument/2006/customXml" ds:itemID="{A1D6F4C0-5AE6-4B29-A335-C1EC6DFED2A8}">
+  <ds:schemaRefs/>
+</ds:datastoreItem>
 </file>
</xml_diff>

<commit_message>
Slide related to the Integration of WoT Thing Directory in the iotschema-node-red Project has been modified.
</commit_message>
<xml_diff>
--- a/iotschema-20190117.pptx
+++ b/iotschema-20190117.pptx
@@ -25,13 +25,13 @@
   <p:sldSz cx="9144000" cy="6858000" type="letter"/>
   <p:notesSz cx="6858000" cy="9144000"/>
   <p:custDataLst>
-    <p:custData r:id="rId6"/>
-    <p:custData r:id="rId1"/>
     <p:custData r:id="rId7"/>
     <p:custData r:id="rId4"/>
+    <p:custData r:id="rId3"/>
+    <p:custData r:id="rId1"/>
+    <p:custData r:id="rId6"/>
+    <p:custData r:id="rId2"/>
     <p:custData r:id="rId5"/>
-    <p:custData r:id="rId2"/>
-    <p:custData r:id="rId3"/>
   </p:custDataLst>
   <p:defaultTextStyle>
     <a:defPPr>
@@ -130,7 +130,7 @@
   </p:defaultTextStyle>
   <p:extLst>
     <p:ext uri="{EFAFB233-063F-42B5-8137-9DF3F51BA10A}">
-      <p15:sldGuideLst xmlns="" xmlns:p15="http://schemas.microsoft.com/office/powerpoint/2012/main"/>
+      <p15:sldGuideLst xmlns:p15="http://schemas.microsoft.com/office/powerpoint/2012/main" xmlns=""/>
     </p:ext>
   </p:extLst>
 </p:presentation>
@@ -4881,15 +4881,11 @@
           <a:lstStyle/>
           <a:p>
             <a:r>
-              <a:rPr lang="en-US"/>
-              <a:t>2019 </a:t>
-            </a:r>
-            <a:r>
-              <a:rPr lang="en-US"/>
-              <a:t>Roadmap </a:t>
-            </a:r>
-            <a:r>
-              <a:rPr lang="en-US" smtClean="0"/>
+              <a:rPr lang="en-US" dirty="0"/>
+              <a:t>2019 Roadmap </a:t>
+            </a:r>
+            <a:r>
+              <a:rPr lang="en-US" dirty="0" smtClean="0"/>
               <a:t>Cont’d</a:t>
             </a:r>
             <a:endParaRPr lang="en-US" dirty="0"/>
@@ -5534,68 +5530,137 @@
           </a:p>
         </p:txBody>
       </p:sp>
-      <p:pic>
-        <p:nvPicPr>
-          <p:cNvPr id="4098" name="Picture 2"/>
-          <p:cNvPicPr>
-            <a:picLocks noChangeAspect="1" noChangeArrowheads="1"/>
-          </p:cNvPicPr>
+      <p:grpSp>
+        <p:nvGrpSpPr>
+          <p:cNvPr id="5" name="Group 4"/>
+          <p:cNvGrpSpPr/>
           <p:nvPr/>
-        </p:nvPicPr>
-        <p:blipFill rotWithShape="1">
-          <a:blip r:embed="rId3">
-            <a:extLst>
-              <a:ext uri="{28A0092B-C50C-407E-A947-70E740481C1C}">
-                <a14:useLocalDpi xmlns:a14="http://schemas.microsoft.com/office/drawing/2010/main" val="0"/>
-              </a:ext>
-            </a:extLst>
-          </a:blip>
-          <a:srcRect l="3485" t="2867"/>
-          <a:stretch/>
-        </p:blipFill>
-        <p:spPr bwMode="auto">
+        </p:nvGrpSpPr>
+        <p:grpSpPr>
           <a:xfrm>
             <a:off x="467544" y="1700808"/>
             <a:ext cx="8229600" cy="4119210"/>
+            <a:chOff x="467544" y="1700808"/>
+            <a:chExt cx="8229600" cy="4119210"/>
           </a:xfrm>
-          <a:prstGeom prst="rect">
-            <a:avLst/>
-          </a:prstGeom>
-          <a:noFill/>
-          <a:ln>
+        </p:grpSpPr>
+        <p:pic>
+          <p:nvPicPr>
+            <p:cNvPr id="4098" name="Picture 2"/>
+            <p:cNvPicPr>
+              <a:picLocks noChangeAspect="1" noChangeArrowheads="1"/>
+            </p:cNvPicPr>
+            <p:nvPr/>
+          </p:nvPicPr>
+          <p:blipFill rotWithShape="1">
+            <a:blip r:embed="rId3">
+              <a:extLst>
+                <a:ext uri="{28A0092B-C50C-407E-A947-70E740481C1C}">
+                  <a14:useLocalDpi xmlns:a14="http://schemas.microsoft.com/office/drawing/2010/main" val="0"/>
+                </a:ext>
+              </a:extLst>
+            </a:blip>
+            <a:srcRect l="3485" t="2867"/>
+            <a:stretch/>
+          </p:blipFill>
+          <p:spPr bwMode="auto">
+            <a:xfrm>
+              <a:off x="467544" y="1700808"/>
+              <a:ext cx="8229600" cy="4119210"/>
+            </a:xfrm>
+            <a:prstGeom prst="rect">
+              <a:avLst/>
+            </a:prstGeom>
             <a:noFill/>
-          </a:ln>
-          <a:effectLst/>
-          <a:extLst>
-            <a:ext uri="{909E8E84-426E-40DD-AFC4-6F175D3DCCD1}">
-              <a14:hiddenFill xmlns:a14="http://schemas.microsoft.com/office/drawing/2010/main">
-                <a:solidFill>
-                  <a:schemeClr val="accent1"/>
-                </a:solidFill>
-              </a14:hiddenFill>
-            </a:ext>
-            <a:ext uri="{91240B29-F687-4F45-9708-019B960494DF}">
-              <a14:hiddenLine xmlns:a14="http://schemas.microsoft.com/office/drawing/2010/main" w="9525">
-                <a:solidFill>
-                  <a:schemeClr val="tx1"/>
-                </a:solidFill>
-                <a:miter lim="800000"/>
-                <a:headEnd/>
-                <a:tailEnd/>
-              </a14:hiddenLine>
-            </a:ext>
-            <a:ext uri="{AF507438-7753-43E0-B8FC-AC1667EBCBE1}">
-              <a14:hiddenEffects xmlns:a14="http://schemas.microsoft.com/office/drawing/2010/main">
-                <a:effectLst>
-                  <a:outerShdw dist="35921" dir="2700000" algn="ctr" rotWithShape="0">
-                    <a:schemeClr val="bg2"/>
-                  </a:outerShdw>
-                </a:effectLst>
-              </a14:hiddenEffects>
-            </a:ext>
-          </a:extLst>
-        </p:spPr>
-      </p:pic>
+            <a:ln>
+              <a:noFill/>
+            </a:ln>
+            <a:effectLst/>
+            <a:extLst>
+              <a:ext uri="{909E8E84-426E-40DD-AFC4-6F175D3DCCD1}">
+                <a14:hiddenFill xmlns:a14="http://schemas.microsoft.com/office/drawing/2010/main">
+                  <a:solidFill>
+                    <a:schemeClr val="accent1"/>
+                  </a:solidFill>
+                </a14:hiddenFill>
+              </a:ext>
+              <a:ext uri="{91240B29-F687-4F45-9708-019B960494DF}">
+                <a14:hiddenLine xmlns:a14="http://schemas.microsoft.com/office/drawing/2010/main" w="9525">
+                  <a:solidFill>
+                    <a:schemeClr val="tx1"/>
+                  </a:solidFill>
+                  <a:miter lim="800000"/>
+                  <a:headEnd/>
+                  <a:tailEnd/>
+                </a14:hiddenLine>
+              </a:ext>
+              <a:ext uri="{AF507438-7753-43E0-B8FC-AC1667EBCBE1}">
+                <a14:hiddenEffects xmlns:a14="http://schemas.microsoft.com/office/drawing/2010/main">
+                  <a:effectLst>
+                    <a:outerShdw dist="35921" dir="2700000" algn="ctr" rotWithShape="0">
+                      <a:schemeClr val="bg2"/>
+                    </a:outerShdw>
+                  </a:effectLst>
+                </a14:hiddenEffects>
+              </a:ext>
+            </a:extLst>
+          </p:spPr>
+        </p:pic>
+        <p:pic>
+          <p:nvPicPr>
+            <p:cNvPr id="1026" name="Picture 2"/>
+            <p:cNvPicPr>
+              <a:picLocks noChangeAspect="1" noChangeArrowheads="1"/>
+            </p:cNvPicPr>
+            <p:nvPr/>
+          </p:nvPicPr>
+          <p:blipFill>
+            <a:blip r:embed="rId4">
+              <a:extLst>
+                <a:ext uri="{28A0092B-C50C-407E-A947-70E740481C1C}">
+                  <a14:useLocalDpi xmlns:a14="http://schemas.microsoft.com/office/drawing/2010/main" val="0"/>
+                </a:ext>
+              </a:extLst>
+            </a:blip>
+            <a:srcRect/>
+            <a:stretch>
+              <a:fillRect/>
+            </a:stretch>
+          </p:blipFill>
+          <p:spPr bwMode="auto">
+            <a:xfrm>
+              <a:off x="7296150" y="2208213"/>
+              <a:ext cx="1400994" cy="3497712"/>
+            </a:xfrm>
+            <a:prstGeom prst="rect">
+              <a:avLst/>
+            </a:prstGeom>
+            <a:noFill/>
+            <a:ln>
+              <a:noFill/>
+            </a:ln>
+            <a:extLst>
+              <a:ext uri="{909E8E84-426E-40DD-AFC4-6F175D3DCCD1}">
+                <a14:hiddenFill xmlns:a14="http://schemas.microsoft.com/office/drawing/2010/main">
+                  <a:solidFill>
+                    <a:schemeClr val="accent1"/>
+                  </a:solidFill>
+                </a14:hiddenFill>
+              </a:ext>
+              <a:ext uri="{91240B29-F687-4F45-9708-019B960494DF}">
+                <a14:hiddenLine xmlns:a14="http://schemas.microsoft.com/office/drawing/2010/main" w="9525">
+                  <a:solidFill>
+                    <a:schemeClr val="tx1"/>
+                  </a:solidFill>
+                  <a:miter lim="800000"/>
+                  <a:headEnd/>
+                  <a:tailEnd/>
+                </a14:hiddenLine>
+              </a:ext>
+            </a:extLst>
+          </p:spPr>
+        </p:pic>
+      </p:grpSp>
       <p:sp>
         <p:nvSpPr>
           <p:cNvPr id="3" name="Rectangle 2"/>
@@ -5604,8 +5669,8 @@
         </p:nvSpPr>
         <p:spPr>
           <a:xfrm>
-            <a:off x="7287616" y="2204864"/>
-            <a:ext cx="1388840" cy="3456384"/>
+            <a:off x="7294785" y="2201915"/>
+            <a:ext cx="1388840" cy="3504009"/>
           </a:xfrm>
           <a:prstGeom prst="rect">
             <a:avLst/>
@@ -5615,6 +5680,13 @@
               <a:alpha val="0"/>
             </a:schemeClr>
           </a:solidFill>
+          <a:ln w="25400">
+            <a:solidFill>
+              <a:schemeClr val="accent5">
+                <a:lumMod val="75000"/>
+              </a:schemeClr>
+            </a:solidFill>
+          </a:ln>
         </p:spPr>
         <p:style>
           <a:lnRef idx="2">
@@ -5842,13 +5914,13 @@
       </p:sp>
       <p:pic>
         <p:nvPicPr>
-          <p:cNvPr id="5122" name="Picture 2"/>
+          <p:cNvPr id="2050" name="Picture 2"/>
           <p:cNvPicPr>
             <a:picLocks noChangeAspect="1" noChangeArrowheads="1"/>
           </p:cNvPicPr>
           <p:nvPr/>
         </p:nvPicPr>
-        <p:blipFill rotWithShape="1">
+        <p:blipFill>
           <a:blip r:embed="rId3">
             <a:extLst>
               <a:ext uri="{28A0092B-C50C-407E-A947-70E740481C1C}">
@@ -5856,13 +5928,15 @@
               </a:ext>
             </a:extLst>
           </a:blip>
-          <a:srcRect l="83286" t="14543" b="35593"/>
-          <a:stretch/>
+          <a:srcRect/>
+          <a:stretch>
+            <a:fillRect/>
+          </a:stretch>
         </p:blipFill>
         <p:spPr bwMode="auto">
           <a:xfrm>
-            <a:off x="5259795" y="1634299"/>
-            <a:ext cx="3056621" cy="4531005"/>
+            <a:off x="5070702" y="1960101"/>
+            <a:ext cx="3248025" cy="4086225"/>
           </a:xfrm>
           <a:prstGeom prst="rect">
             <a:avLst/>
@@ -5871,7 +5945,6 @@
           <a:ln>
             <a:noFill/>
           </a:ln>
-          <a:effectLst/>
           <a:extLst>
             <a:ext uri="{909E8E84-426E-40DD-AFC4-6F175D3DCCD1}">
               <a14:hiddenFill xmlns:a14="http://schemas.microsoft.com/office/drawing/2010/main">
@@ -5889,15 +5962,6 @@
                 <a:headEnd/>
                 <a:tailEnd/>
               </a14:hiddenLine>
-            </a:ext>
-            <a:ext uri="{AF507438-7753-43E0-B8FC-AC1667EBCBE1}">
-              <a14:hiddenEffects xmlns:a14="http://schemas.microsoft.com/office/drawing/2010/main">
-                <a:effectLst>
-                  <a:outerShdw dist="35921" dir="2700000" algn="ctr" rotWithShape="0">
-                    <a:schemeClr val="bg2"/>
-                  </a:outerShdw>
-                </a:effectLst>
-              </a14:hiddenEffects>
             </a:ext>
           </a:extLst>
         </p:spPr>
@@ -6036,6 +6100,13 @@
   <p:clrMapOvr>
     <a:masterClrMapping/>
   </p:clrMapOvr>
+  <p:timing>
+    <p:tnLst>
+      <p:par>
+        <p:cTn id="1" dur="indefinite" restart="never" nodeType="tmRoot"/>
+      </p:par>
+    </p:tnLst>
+  </p:timing>
 </p:sld>
 </file>
 
@@ -6628,7 +6699,7 @@
   <a:extraClrSchemeLst/>
   <a:extLst>
     <a:ext uri="{05A4C25C-085E-4340-85A3-A5531E510DB2}">
-      <thm15:themeFamily xmlns="" xmlns:thm15="http://schemas.microsoft.com/office/thememl/2012/main" name="Office Theme" id="{62F939B6-93AF-4DB8-9C6B-D6C7DFDC589F}" vid="{4A3C46E8-61CC-4603-A589-7422A47A8E4A}"/>
+      <thm15:themeFamily xmlns:thm15="http://schemas.microsoft.com/office/thememl/2012/main" xmlns="" name="Office Theme" id="{62F939B6-93AF-4DB8-9C6B-D6C7DFDC589F}" vid="{4A3C46E8-61CC-4603-A589-7422A47A8E4A}"/>
     </a:ext>
   </a:extLst>
 </a:theme>
@@ -6920,27 +6991,27 @@
 </file>
 
 <file path=customXml/item1.xml><?xml version="1.0" encoding="utf-8"?>
-<VariableListDefinition name="AD_HOC" displayName="AD_HOC" id="08196e94-c6d9-45d5-87e5-f7eedd66d072" isdomainofvalue="False" dataSourceId="3ef9f60c-ee3f-49da-bd8e-be786ce8830e"/>
+<VariableListDefinition name="AD_HOC" displayName="AD_HOC" id="1189e2ad-6b16-490a-8dc3-bba7ecfa960e" isdomainofvalue="False" dataSourceId="b9e995c0-f1b8-4329-9c25-03812e31520b"/>
 </file>
 
 <file path=customXml/item2.xml><?xml version="1.0" encoding="utf-8"?>
-<VariableList UniqueId="08196e94-c6d9-45d5-87e5-f7eedd66d072" Name="AD_HOC" ContentType="XML" MajorVersion="0" MinorVersion="1" isLocalCopy="False" IsBaseObject="False" DataSourceId="3ef9f60c-ee3f-49da-bd8e-be786ce8830e" DataSourceMajorVersion="0" DataSourceMinorVersion="1"/>
+<VariableList UniqueId="1189e2ad-6b16-490a-8dc3-bba7ecfa960e" Name="AD_HOC" ContentType="XML" MajorVersion="0" MinorVersion="1" isLocalCopy="False" IsBaseObject="False" DataSourceId="b9e995c0-f1b8-4329-9c25-03812e31520b" DataSourceMajorVersion="0" DataSourceMinorVersion="1"/>
 </file>
 
 <file path=customXml/item3.xml><?xml version="1.0" encoding="utf-8"?>
-<VariableListDefinition name="Computed" displayName="Computed" id="87a35e05-47b9-4c9d-8663-1863a8b379a2" isdomainofvalue="False" dataSourceId="e3b72ae6-dc78-48cc-9ef6-4ad25f989dc1"/>
+<VariableListDefinition name="Computed" displayName="Computed" id="bb367a63-45d5-4891-8cea-ba9fb509d9a0" isdomainofvalue="False" dataSourceId="449ab6ea-bcfc-479d-b5cb-4dc997c740c5"/>
 </file>
 
 <file path=customXml/item4.xml><?xml version="1.0" encoding="utf-8"?>
-<VariableList UniqueId="87a35e05-47b9-4c9d-8663-1863a8b379a2" Name="Computed" ContentType="XML" MajorVersion="0" MinorVersion="1" isLocalCopy="False" IsBaseObject="False" DataSourceId="e3b72ae6-dc78-48cc-9ef6-4ad25f989dc1" DataSourceMajorVersion="0" DataSourceMinorVersion="1"/>
+<VariableList UniqueId="bb367a63-45d5-4891-8cea-ba9fb509d9a0" Name="Computed" ContentType="XML" MajorVersion="0" MinorVersion="1" isLocalCopy="False" IsBaseObject="False" DataSourceId="449ab6ea-bcfc-479d-b5cb-4dc997c740c5" DataSourceMajorVersion="0" DataSourceMinorVersion="1"/>
 </file>
 
 <file path=customXml/item5.xml><?xml version="1.0" encoding="utf-8"?>
-<VariableListDefinition name="System" displayName="System" id="8d3c380b-4528-4842-b76a-582a120f33a8" isdomainofvalue="False" dataSourceId="d270b0ca-fd32-4393-b48c-69522105350d"/>
+<VariableListDefinition name="System" displayName="System" id="0d16843a-9c1b-4f22-a2f7-bb52995b7964" isdomainofvalue="False" dataSourceId="9dbadfa4-88f4-46df-9c25-eb34e282b3f7"/>
 </file>
 
 <file path=customXml/item6.xml><?xml version="1.0" encoding="utf-8"?>
-<VariableList UniqueId="8d3c380b-4528-4842-b76a-582a120f33a8" Name="System" ContentType="XML" MajorVersion="0" MinorVersion="1" isLocalCopy="False" IsBaseObject="False" DataSourceId="d270b0ca-fd32-4393-b48c-69522105350d" DataSourceMajorVersion="0" DataSourceMinorVersion="1"/>
+<VariableList UniqueId="0d16843a-9c1b-4f22-a2f7-bb52995b7964" Name="System" ContentType="XML" MajorVersion="0" MinorVersion="1" isLocalCopy="False" IsBaseObject="False" DataSourceId="9dbadfa4-88f4-46df-9c25-eb34e282b3f7" DataSourceMajorVersion="0" DataSourceMinorVersion="1"/>
 </file>
 
 <file path=customXml/item7.xml><?xml version="1.0" encoding="utf-8"?>
@@ -6948,43 +7019,43 @@
 </file>
 
 <file path=customXml/itemProps1.xml><?xml version="1.0" encoding="utf-8"?>
-<ds:datastoreItem xmlns:ds="http://schemas.openxmlformats.org/officeDocument/2006/customXml" ds:itemID="{859FDAA5-92F5-4CAA-B537-8FD280DD13D8}">
+<ds:datastoreItem xmlns:ds="http://schemas.openxmlformats.org/officeDocument/2006/customXml" ds:itemID="{FF4D07BA-BD3D-4B08-8800-96DD647EFD48}">
   <ds:schemaRefs/>
 </ds:datastoreItem>
 </file>
 
 <file path=customXml/itemProps2.xml><?xml version="1.0" encoding="utf-8"?>
-<ds:datastoreItem xmlns:ds="http://schemas.openxmlformats.org/officeDocument/2006/customXml" ds:itemID="{05EE18CB-0F25-401D-A52A-B8F6BA744AD1}">
+<ds:datastoreItem xmlns:ds="http://schemas.openxmlformats.org/officeDocument/2006/customXml" ds:itemID="{4255DBD8-6510-4E16-B682-649C7EDB1EC6}">
   <ds:schemaRefs/>
 </ds:datastoreItem>
 </file>
 
 <file path=customXml/itemProps3.xml><?xml version="1.0" encoding="utf-8"?>
-<ds:datastoreItem xmlns:ds="http://schemas.openxmlformats.org/officeDocument/2006/customXml" ds:itemID="{DA7B8851-9D1D-4463-916B-D2C02412B40D}">
+<ds:datastoreItem xmlns:ds="http://schemas.openxmlformats.org/officeDocument/2006/customXml" ds:itemID="{F3590FFE-0C8B-444A-AA74-690534E3D790}">
   <ds:schemaRefs/>
 </ds:datastoreItem>
 </file>
 
 <file path=customXml/itemProps4.xml><?xml version="1.0" encoding="utf-8"?>
-<ds:datastoreItem xmlns:ds="http://schemas.openxmlformats.org/officeDocument/2006/customXml" ds:itemID="{D3AE1101-1415-4737-B53C-2E4C059159FF}">
+<ds:datastoreItem xmlns:ds="http://schemas.openxmlformats.org/officeDocument/2006/customXml" ds:itemID="{E8A75A7A-4129-4B6F-B724-DC83661A1CC8}">
   <ds:schemaRefs/>
 </ds:datastoreItem>
 </file>
 
 <file path=customXml/itemProps5.xml><?xml version="1.0" encoding="utf-8"?>
-<ds:datastoreItem xmlns:ds="http://schemas.openxmlformats.org/officeDocument/2006/customXml" ds:itemID="{C64D6718-D87F-4267-BEE8-6AFA3E0F7C60}">
+<ds:datastoreItem xmlns:ds="http://schemas.openxmlformats.org/officeDocument/2006/customXml" ds:itemID="{B44F1013-B407-4BF6-A598-26914FF99F5C}">
   <ds:schemaRefs/>
 </ds:datastoreItem>
 </file>
 
 <file path=customXml/itemProps6.xml><?xml version="1.0" encoding="utf-8"?>
-<ds:datastoreItem xmlns:ds="http://schemas.openxmlformats.org/officeDocument/2006/customXml" ds:itemID="{5D86267E-3200-427C-BE0A-9C2C0395B15C}">
+<ds:datastoreItem xmlns:ds="http://schemas.openxmlformats.org/officeDocument/2006/customXml" ds:itemID="{39C28544-1C0C-4FF6-8131-6A09BABD99A3}">
   <ds:schemaRefs/>
 </ds:datastoreItem>
 </file>
 
 <file path=customXml/itemProps7.xml><?xml version="1.0" encoding="utf-8"?>
-<ds:datastoreItem xmlns:ds="http://schemas.openxmlformats.org/officeDocument/2006/customXml" ds:itemID="{17B4BD35-D0AD-468D-8B12-9F854C1992E0}">
+<ds:datastoreItem xmlns:ds="http://schemas.openxmlformats.org/officeDocument/2006/customXml" ds:itemID="{8C83B9EF-B02D-4F98-8361-EBD2885B4C13}">
   <ds:schemaRefs/>
 </ds:datastoreItem>
 </file>
</xml_diff>

<commit_message>
Teleconference slides February 21, 2019
</commit_message>
<xml_diff>
--- a/iotschema-20190117.pptx
+++ b/iotschema-20190117.pptx
@@ -2995,6 +2995,13 @@
   <p:clrMapOvr>
     <a:masterClrMapping/>
   </p:clrMapOvr>
+  <p:timing>
+    <p:tnLst>
+      <p:par>
+        <p:cTn id="1" dur="indefinite" restart="never" nodeType="tmRoot"/>
+      </p:par>
+    </p:tnLst>
+  </p:timing>
 </p:sld>
 </file>
 
@@ -3147,6 +3154,13 @@
   <p:clrMapOvr>
     <a:masterClrMapping/>
   </p:clrMapOvr>
+  <p:timing>
+    <p:tnLst>
+      <p:par>
+        <p:cTn id="1" dur="indefinite" restart="never" nodeType="tmRoot"/>
+      </p:par>
+    </p:tnLst>
+  </p:timing>
 </p:sld>
 </file>
 
@@ -3264,6 +3278,13 @@
   <p:clrMapOvr>
     <a:masterClrMapping/>
   </p:clrMapOvr>
+  <p:timing>
+    <p:tnLst>
+      <p:par>
+        <p:cTn id="1" dur="indefinite" restart="never" nodeType="tmRoot"/>
+      </p:par>
+    </p:tnLst>
+  </p:timing>
 </p:sld>
 </file>
 
@@ -3439,6 +3460,13 @@
   <p:clrMapOvr>
     <a:masterClrMapping/>
   </p:clrMapOvr>
+  <p:timing>
+    <p:tnLst>
+      <p:par>
+        <p:cTn id="1" dur="indefinite" restart="never" nodeType="tmRoot"/>
+      </p:par>
+    </p:tnLst>
+  </p:timing>
 </p:sld>
 </file>
 

</xml_diff>

<commit_message>
iotschema slides presented at IoT Week, Aarhus, Denmark - 20.06.2019.
</commit_message>
<xml_diff>
--- a/iotschema-20190117.pptx
+++ b/iotschema-20190117.pptx
@@ -25,13 +25,13 @@
   <p:sldSz cx="9144000" cy="6858000" type="letter"/>
   <p:notesSz cx="6858000" cy="9144000"/>
   <p:custDataLst>
+    <p:custData r:id="rId5"/>
+    <p:custData r:id="rId2"/>
+    <p:custData r:id="rId6"/>
+    <p:custData r:id="rId3"/>
     <p:custData r:id="rId7"/>
+    <p:custData r:id="rId1"/>
     <p:custData r:id="rId4"/>
-    <p:custData r:id="rId3"/>
-    <p:custData r:id="rId1"/>
-    <p:custData r:id="rId6"/>
-    <p:custData r:id="rId2"/>
-    <p:custData r:id="rId5"/>
   </p:custDataLst>
   <p:defaultTextStyle>
     <a:defPPr>
@@ -4455,6 +4455,13 @@
   <p:clrMapOvr>
     <a:masterClrMapping/>
   </p:clrMapOvr>
+  <p:timing>
+    <p:tnLst>
+      <p:par>
+        <p:cTn id="1" dur="indefinite" restart="never" nodeType="tmRoot"/>
+      </p:par>
+    </p:tnLst>
+  </p:timing>
 </p:sld>
 </file>
 
@@ -5150,6 +5157,13 @@
   <p:clrMapOvr>
     <a:masterClrMapping/>
   </p:clrMapOvr>
+  <p:timing>
+    <p:tnLst>
+      <p:par>
+        <p:cTn id="1" dur="indefinite" restart="never" nodeType="tmRoot"/>
+      </p:par>
+    </p:tnLst>
+  </p:timing>
 </p:sld>
 </file>
 
@@ -6282,6 +6296,13 @@
   <p:clrMapOvr>
     <a:masterClrMapping/>
   </p:clrMapOvr>
+  <p:timing>
+    <p:tnLst>
+      <p:par>
+        <p:cTn id="1" dur="indefinite" restart="never" nodeType="tmRoot"/>
+      </p:par>
+    </p:tnLst>
+  </p:timing>
 </p:sld>
 </file>
 
@@ -6441,6 +6462,13 @@
   <p:clrMapOvr>
     <a:masterClrMapping/>
   </p:clrMapOvr>
+  <p:timing>
+    <p:tnLst>
+      <p:par>
+        <p:cTn id="1" dur="indefinite" restart="never" nodeType="tmRoot"/>
+      </p:par>
+    </p:tnLst>
+  </p:timing>
 </p:sld>
 </file>
 
@@ -7019,43 +7047,43 @@
 </file>
 
 <file path=customXml/itemProps1.xml><?xml version="1.0" encoding="utf-8"?>
-<ds:datastoreItem xmlns:ds="http://schemas.openxmlformats.org/officeDocument/2006/customXml" ds:itemID="{FF4D07BA-BD3D-4B08-8800-96DD647EFD48}">
+<ds:datastoreItem xmlns:ds="http://schemas.openxmlformats.org/officeDocument/2006/customXml" ds:itemID="{9136FEFE-69B5-4816-8B0B-F2B819A319B1}">
   <ds:schemaRefs/>
 </ds:datastoreItem>
 </file>
 
 <file path=customXml/itemProps2.xml><?xml version="1.0" encoding="utf-8"?>
-<ds:datastoreItem xmlns:ds="http://schemas.openxmlformats.org/officeDocument/2006/customXml" ds:itemID="{4255DBD8-6510-4E16-B682-649C7EDB1EC6}">
+<ds:datastoreItem xmlns:ds="http://schemas.openxmlformats.org/officeDocument/2006/customXml" ds:itemID="{222ABE9D-12D3-4093-9F85-99857622E0EE}">
   <ds:schemaRefs/>
 </ds:datastoreItem>
 </file>
 
 <file path=customXml/itemProps3.xml><?xml version="1.0" encoding="utf-8"?>
-<ds:datastoreItem xmlns:ds="http://schemas.openxmlformats.org/officeDocument/2006/customXml" ds:itemID="{F3590FFE-0C8B-444A-AA74-690534E3D790}">
+<ds:datastoreItem xmlns:ds="http://schemas.openxmlformats.org/officeDocument/2006/customXml" ds:itemID="{8A6900AD-90D0-4ED4-8D77-6E1D4BA1A161}">
   <ds:schemaRefs/>
 </ds:datastoreItem>
 </file>
 
 <file path=customXml/itemProps4.xml><?xml version="1.0" encoding="utf-8"?>
-<ds:datastoreItem xmlns:ds="http://schemas.openxmlformats.org/officeDocument/2006/customXml" ds:itemID="{E8A75A7A-4129-4B6F-B724-DC83661A1CC8}">
+<ds:datastoreItem xmlns:ds="http://schemas.openxmlformats.org/officeDocument/2006/customXml" ds:itemID="{82E3CDF8-9533-4208-8B17-72FB80BAD4C9}">
   <ds:schemaRefs/>
 </ds:datastoreItem>
 </file>
 
 <file path=customXml/itemProps5.xml><?xml version="1.0" encoding="utf-8"?>
-<ds:datastoreItem xmlns:ds="http://schemas.openxmlformats.org/officeDocument/2006/customXml" ds:itemID="{B44F1013-B407-4BF6-A598-26914FF99F5C}">
+<ds:datastoreItem xmlns:ds="http://schemas.openxmlformats.org/officeDocument/2006/customXml" ds:itemID="{4B17AE69-5898-478A-AC75-A2947315A463}">
   <ds:schemaRefs/>
 </ds:datastoreItem>
 </file>
 
 <file path=customXml/itemProps6.xml><?xml version="1.0" encoding="utf-8"?>
-<ds:datastoreItem xmlns:ds="http://schemas.openxmlformats.org/officeDocument/2006/customXml" ds:itemID="{39C28544-1C0C-4FF6-8131-6A09BABD99A3}">
+<ds:datastoreItem xmlns:ds="http://schemas.openxmlformats.org/officeDocument/2006/customXml" ds:itemID="{BF6A7320-6C18-4F51-B371-5142D9555AB4}">
   <ds:schemaRefs/>
 </ds:datastoreItem>
 </file>
 
 <file path=customXml/itemProps7.xml><?xml version="1.0" encoding="utf-8"?>
-<ds:datastoreItem xmlns:ds="http://schemas.openxmlformats.org/officeDocument/2006/customXml" ds:itemID="{8C83B9EF-B02D-4F98-8361-EBD2885B4C13}">
+<ds:datastoreItem xmlns:ds="http://schemas.openxmlformats.org/officeDocument/2006/customXml" ds:itemID="{C5E3456C-06C8-4A27-B1C3-7B179D754C09}">
   <ds:schemaRefs/>
 </ds:datastoreItem>
 </file>
</xml_diff>